<commit_message>
Added slides and applied corrections
</commit_message>
<xml_diff>
--- a/slides/10_DimensionalityReduction_Part1.pptx
+++ b/slides/10_DimensionalityReduction_Part1.pptx
@@ -6,7 +6,7 @@
     <p:sldMasterId id="2147483668" r:id="rId2"/>
   </p:sldMasterIdLst>
   <p:notesMasterIdLst>
-    <p:notesMasterId r:id="rId45"/>
+    <p:notesMasterId r:id="rId47"/>
   </p:notesMasterIdLst>
   <p:sldIdLst>
     <p:sldId id="275" r:id="rId3"/>
@@ -35,22 +35,24 @@
     <p:sldId id="715" r:id="rId26"/>
     <p:sldId id="720" r:id="rId27"/>
     <p:sldId id="726" r:id="rId28"/>
-    <p:sldId id="734" r:id="rId29"/>
-    <p:sldId id="702" r:id="rId30"/>
-    <p:sldId id="737" r:id="rId31"/>
-    <p:sldId id="700" r:id="rId32"/>
-    <p:sldId id="701" r:id="rId33"/>
-    <p:sldId id="716" r:id="rId34"/>
-    <p:sldId id="738" r:id="rId35"/>
-    <p:sldId id="735" r:id="rId36"/>
-    <p:sldId id="620" r:id="rId37"/>
-    <p:sldId id="606" r:id="rId38"/>
-    <p:sldId id="607" r:id="rId39"/>
-    <p:sldId id="622" r:id="rId40"/>
-    <p:sldId id="621" r:id="rId41"/>
-    <p:sldId id="626" r:id="rId42"/>
-    <p:sldId id="627" r:id="rId43"/>
-    <p:sldId id="724" r:id="rId44"/>
+    <p:sldId id="739" r:id="rId29"/>
+    <p:sldId id="734" r:id="rId30"/>
+    <p:sldId id="702" r:id="rId31"/>
+    <p:sldId id="737" r:id="rId32"/>
+    <p:sldId id="700" r:id="rId33"/>
+    <p:sldId id="701" r:id="rId34"/>
+    <p:sldId id="716" r:id="rId35"/>
+    <p:sldId id="738" r:id="rId36"/>
+    <p:sldId id="735" r:id="rId37"/>
+    <p:sldId id="620" r:id="rId38"/>
+    <p:sldId id="606" r:id="rId39"/>
+    <p:sldId id="607" r:id="rId40"/>
+    <p:sldId id="622" r:id="rId41"/>
+    <p:sldId id="621" r:id="rId42"/>
+    <p:sldId id="626" r:id="rId43"/>
+    <p:sldId id="627" r:id="rId44"/>
+    <p:sldId id="740" r:id="rId45"/>
+    <p:sldId id="724" r:id="rId46"/>
   </p:sldIdLst>
   <p:sldSz cx="12192000" cy="6858000"/>
   <p:notesSz cx="6858000" cy="9144000"/>
@@ -239,7 +241,7 @@
           <a:p>
             <a:fld id="{ED460DB7-3564-4028-881B-4A225B453265}" type="datetimeFigureOut">
               <a:rPr lang="en-US" smtClean="0"/>
-              <a:t>4/8/2023</a:t>
+              <a:t>4/10/2023</a:t>
             </a:fld>
             <a:endParaRPr lang="en-US"/>
           </a:p>
@@ -742,7 +744,7 @@
             <a:fld id="{4CFD207A-07DF-40AD-A916-9872E089CE7A}" type="slidenum">
               <a:rPr lang="en-US" smtClean="0"/>
               <a:pPr/>
-              <a:t>35</a:t>
+              <a:t>27</a:t>
             </a:fld>
             <a:endParaRPr lang="en-US"/>
           </a:p>
@@ -751,7 +753,7 @@
     </p:spTree>
     <p:extLst>
       <p:ext uri="{BB962C8B-B14F-4D97-AF65-F5344CB8AC3E}">
-        <p14:creationId xmlns:p14="http://schemas.microsoft.com/office/powerpoint/2010/main" val="377753752"/>
+        <p14:creationId xmlns:p14="http://schemas.microsoft.com/office/powerpoint/2010/main" val="1630513421"/>
       </p:ext>
     </p:extLst>
   </p:cSld>
@@ -836,7 +838,7 @@
     </p:spTree>
     <p:extLst>
       <p:ext uri="{BB962C8B-B14F-4D97-AF65-F5344CB8AC3E}">
-        <p14:creationId xmlns:p14="http://schemas.microsoft.com/office/powerpoint/2010/main" val="3089706621"/>
+        <p14:creationId xmlns:p14="http://schemas.microsoft.com/office/powerpoint/2010/main" val="377753752"/>
       </p:ext>
     </p:extLst>
   </p:cSld>
@@ -921,7 +923,7 @@
     </p:spTree>
     <p:extLst>
       <p:ext uri="{BB962C8B-B14F-4D97-AF65-F5344CB8AC3E}">
-        <p14:creationId xmlns:p14="http://schemas.microsoft.com/office/powerpoint/2010/main" val="994236571"/>
+        <p14:creationId xmlns:p14="http://schemas.microsoft.com/office/powerpoint/2010/main" val="3089706621"/>
       </p:ext>
     </p:extLst>
   </p:cSld>
@@ -1006,7 +1008,7 @@
     </p:spTree>
     <p:extLst>
       <p:ext uri="{BB962C8B-B14F-4D97-AF65-F5344CB8AC3E}">
-        <p14:creationId xmlns:p14="http://schemas.microsoft.com/office/powerpoint/2010/main" val="548079403"/>
+        <p14:creationId xmlns:p14="http://schemas.microsoft.com/office/powerpoint/2010/main" val="994236571"/>
       </p:ext>
     </p:extLst>
   </p:cSld>
@@ -1091,7 +1093,7 @@
     </p:spTree>
     <p:extLst>
       <p:ext uri="{BB962C8B-B14F-4D97-AF65-F5344CB8AC3E}">
-        <p14:creationId xmlns:p14="http://schemas.microsoft.com/office/powerpoint/2010/main" val="2024467957"/>
+        <p14:creationId xmlns:p14="http://schemas.microsoft.com/office/powerpoint/2010/main" val="548079403"/>
       </p:ext>
     </p:extLst>
   </p:cSld>
@@ -1176,7 +1178,7 @@
     </p:spTree>
     <p:extLst>
       <p:ext uri="{BB962C8B-B14F-4D97-AF65-F5344CB8AC3E}">
-        <p14:creationId xmlns:p14="http://schemas.microsoft.com/office/powerpoint/2010/main" val="1710571687"/>
+        <p14:creationId xmlns:p14="http://schemas.microsoft.com/office/powerpoint/2010/main" val="2024467957"/>
       </p:ext>
     </p:extLst>
   </p:cSld>
@@ -1261,7 +1263,7 @@
     </p:spTree>
     <p:extLst>
       <p:ext uri="{BB962C8B-B14F-4D97-AF65-F5344CB8AC3E}">
-        <p14:creationId xmlns:p14="http://schemas.microsoft.com/office/powerpoint/2010/main" val="3493435241"/>
+        <p14:creationId xmlns:p14="http://schemas.microsoft.com/office/powerpoint/2010/main" val="1710571687"/>
       </p:ext>
     </p:extLst>
   </p:cSld>
@@ -1346,7 +1348,92 @@
     </p:spTree>
     <p:extLst>
       <p:ext uri="{BB962C8B-B14F-4D97-AF65-F5344CB8AC3E}">
-        <p14:creationId xmlns:p14="http://schemas.microsoft.com/office/powerpoint/2010/main" val="3942215518"/>
+        <p14:creationId xmlns:p14="http://schemas.microsoft.com/office/powerpoint/2010/main" val="3493435241"/>
+      </p:ext>
+    </p:extLst>
+  </p:cSld>
+  <p:clrMapOvr>
+    <a:masterClrMapping/>
+  </p:clrMapOvr>
+</p:notes>
+</file>
+
+<file path=ppt/notesSlides/notesSlide19.xml><?xml version="1.0" encoding="utf-8"?>
+<p:notes xmlns:a="http://schemas.openxmlformats.org/drawingml/2006/main" xmlns:r="http://schemas.openxmlformats.org/officeDocument/2006/relationships" xmlns:p="http://schemas.openxmlformats.org/presentationml/2006/main">
+  <p:cSld>
+    <p:spTree>
+      <p:nvGrpSpPr>
+        <p:cNvPr id="1" name=""/>
+        <p:cNvGrpSpPr/>
+        <p:nvPr/>
+      </p:nvGrpSpPr>
+      <p:grpSpPr>
+        <a:xfrm>
+          <a:off x="0" y="0"/>
+          <a:ext cx="0" cy="0"/>
+          <a:chOff x="0" y="0"/>
+          <a:chExt cx="0" cy="0"/>
+        </a:xfrm>
+      </p:grpSpPr>
+      <p:sp>
+        <p:nvSpPr>
+          <p:cNvPr id="2" name="Slide Image Placeholder 1"/>
+          <p:cNvSpPr>
+            <a:spLocks noGrp="1" noRot="1" noChangeAspect="1"/>
+          </p:cNvSpPr>
+          <p:nvPr>
+            <p:ph type="sldImg"/>
+          </p:nvPr>
+        </p:nvSpPr>
+        <p:spPr/>
+      </p:sp>
+      <p:sp>
+        <p:nvSpPr>
+          <p:cNvPr id="3" name="Notes Placeholder 2"/>
+          <p:cNvSpPr>
+            <a:spLocks noGrp="1"/>
+          </p:cNvSpPr>
+          <p:nvPr>
+            <p:ph type="body" idx="1"/>
+          </p:nvPr>
+        </p:nvSpPr>
+        <p:spPr/>
+        <p:txBody>
+          <a:bodyPr/>
+          <a:lstStyle/>
+          <a:p>
+            <a:endParaRPr lang="en-US" dirty="0"/>
+          </a:p>
+        </p:txBody>
+      </p:sp>
+      <p:sp>
+        <p:nvSpPr>
+          <p:cNvPr id="4" name="Slide Number Placeholder 3"/>
+          <p:cNvSpPr>
+            <a:spLocks noGrp="1"/>
+          </p:cNvSpPr>
+          <p:nvPr>
+            <p:ph type="sldNum" sz="quarter" idx="10"/>
+          </p:nvPr>
+        </p:nvSpPr>
+        <p:spPr/>
+        <p:txBody>
+          <a:bodyPr/>
+          <a:lstStyle/>
+          <a:p>
+            <a:fld id="{4CFD207A-07DF-40AD-A916-9872E089CE7A}" type="slidenum">
+              <a:rPr lang="en-US" smtClean="0"/>
+              <a:pPr/>
+              <a:t>43</a:t>
+            </a:fld>
+            <a:endParaRPr lang="en-US"/>
+          </a:p>
+        </p:txBody>
+      </p:sp>
+    </p:spTree>
+    <p:extLst>
+      <p:ext uri="{BB962C8B-B14F-4D97-AF65-F5344CB8AC3E}">
+        <p14:creationId xmlns:p14="http://schemas.microsoft.com/office/powerpoint/2010/main" val="1090152361"/>
       </p:ext>
     </p:extLst>
   </p:cSld>
@@ -1432,6 +1519,91 @@
     <p:extLst>
       <p:ext uri="{BB962C8B-B14F-4D97-AF65-F5344CB8AC3E}">
         <p14:creationId xmlns:p14="http://schemas.microsoft.com/office/powerpoint/2010/main" val="1732671816"/>
+      </p:ext>
+    </p:extLst>
+  </p:cSld>
+  <p:clrMapOvr>
+    <a:masterClrMapping/>
+  </p:clrMapOvr>
+</p:notes>
+</file>
+
+<file path=ppt/notesSlides/notesSlide20.xml><?xml version="1.0" encoding="utf-8"?>
+<p:notes xmlns:a="http://schemas.openxmlformats.org/drawingml/2006/main" xmlns:r="http://schemas.openxmlformats.org/officeDocument/2006/relationships" xmlns:p="http://schemas.openxmlformats.org/presentationml/2006/main">
+  <p:cSld>
+    <p:spTree>
+      <p:nvGrpSpPr>
+        <p:cNvPr id="1" name=""/>
+        <p:cNvGrpSpPr/>
+        <p:nvPr/>
+      </p:nvGrpSpPr>
+      <p:grpSpPr>
+        <a:xfrm>
+          <a:off x="0" y="0"/>
+          <a:ext cx="0" cy="0"/>
+          <a:chOff x="0" y="0"/>
+          <a:chExt cx="0" cy="0"/>
+        </a:xfrm>
+      </p:grpSpPr>
+      <p:sp>
+        <p:nvSpPr>
+          <p:cNvPr id="2" name="Slide Image Placeholder 1"/>
+          <p:cNvSpPr>
+            <a:spLocks noGrp="1" noRot="1" noChangeAspect="1"/>
+          </p:cNvSpPr>
+          <p:nvPr>
+            <p:ph type="sldImg"/>
+          </p:nvPr>
+        </p:nvSpPr>
+        <p:spPr/>
+      </p:sp>
+      <p:sp>
+        <p:nvSpPr>
+          <p:cNvPr id="3" name="Notes Placeholder 2"/>
+          <p:cNvSpPr>
+            <a:spLocks noGrp="1"/>
+          </p:cNvSpPr>
+          <p:nvPr>
+            <p:ph type="body" idx="1"/>
+          </p:nvPr>
+        </p:nvSpPr>
+        <p:spPr/>
+        <p:txBody>
+          <a:bodyPr/>
+          <a:lstStyle/>
+          <a:p>
+            <a:endParaRPr lang="en-US" dirty="0"/>
+          </a:p>
+        </p:txBody>
+      </p:sp>
+      <p:sp>
+        <p:nvSpPr>
+          <p:cNvPr id="4" name="Slide Number Placeholder 3"/>
+          <p:cNvSpPr>
+            <a:spLocks noGrp="1"/>
+          </p:cNvSpPr>
+          <p:nvPr>
+            <p:ph type="sldNum" sz="quarter" idx="10"/>
+          </p:nvPr>
+        </p:nvSpPr>
+        <p:spPr/>
+        <p:txBody>
+          <a:bodyPr/>
+          <a:lstStyle/>
+          <a:p>
+            <a:fld id="{4CFD207A-07DF-40AD-A916-9872E089CE7A}" type="slidenum">
+              <a:rPr lang="en-US" smtClean="0"/>
+              <a:pPr/>
+              <a:t>44</a:t>
+            </a:fld>
+            <a:endParaRPr lang="en-US"/>
+          </a:p>
+        </p:txBody>
+      </p:sp>
+    </p:spTree>
+    <p:extLst>
+      <p:ext uri="{BB962C8B-B14F-4D97-AF65-F5344CB8AC3E}">
+        <p14:creationId xmlns:p14="http://schemas.microsoft.com/office/powerpoint/2010/main" val="3942215518"/>
       </p:ext>
     </p:extLst>
   </p:cSld>
@@ -2183,7 +2355,7 @@
           <a:p>
             <a:fld id="{C62B3463-61C8-4819-BC9A-C94FD847F060}" type="datetimeFigureOut">
               <a:rPr lang="en-US" smtClean="0"/>
-              <a:t>4/8/2023</a:t>
+              <a:t>4/10/2023</a:t>
             </a:fld>
             <a:endParaRPr lang="en-US"/>
           </a:p>
@@ -2381,7 +2553,7 @@
           <a:p>
             <a:fld id="{C62B3463-61C8-4819-BC9A-C94FD847F060}" type="datetimeFigureOut">
               <a:rPr lang="en-US" smtClean="0"/>
-              <a:t>4/8/2023</a:t>
+              <a:t>4/10/2023</a:t>
             </a:fld>
             <a:endParaRPr lang="en-US"/>
           </a:p>
@@ -2589,7 +2761,7 @@
           <a:p>
             <a:fld id="{C62B3463-61C8-4819-BC9A-C94FD847F060}" type="datetimeFigureOut">
               <a:rPr lang="en-US" smtClean="0"/>
-              <a:t>4/8/2023</a:t>
+              <a:t>4/10/2023</a:t>
             </a:fld>
             <a:endParaRPr lang="en-US"/>
           </a:p>
@@ -3502,7 +3674,7 @@
           <a:p>
             <a:fld id="{4ACD6B4E-9726-48B7-95FC-86DC5068328F}" type="datetimeFigureOut">
               <a:rPr lang="en-US" smtClean="0"/>
-              <a:t>4/8/2023</a:t>
+              <a:t>4/10/2023</a:t>
             </a:fld>
             <a:endParaRPr lang="en-US"/>
           </a:p>
@@ -3700,7 +3872,7 @@
           <a:p>
             <a:fld id="{C62B3463-61C8-4819-BC9A-C94FD847F060}" type="datetimeFigureOut">
               <a:rPr lang="en-US" smtClean="0"/>
-              <a:t>4/8/2023</a:t>
+              <a:t>4/10/2023</a:t>
             </a:fld>
             <a:endParaRPr lang="en-US"/>
           </a:p>
@@ -3975,7 +4147,7 @@
           <a:p>
             <a:fld id="{C62B3463-61C8-4819-BC9A-C94FD847F060}" type="datetimeFigureOut">
               <a:rPr lang="en-US" smtClean="0"/>
-              <a:t>4/8/2023</a:t>
+              <a:t>4/10/2023</a:t>
             </a:fld>
             <a:endParaRPr lang="en-US"/>
           </a:p>
@@ -4240,7 +4412,7 @@
           <a:p>
             <a:fld id="{C62B3463-61C8-4819-BC9A-C94FD847F060}" type="datetimeFigureOut">
               <a:rPr lang="en-US" smtClean="0"/>
-              <a:t>4/8/2023</a:t>
+              <a:t>4/10/2023</a:t>
             </a:fld>
             <a:endParaRPr lang="en-US"/>
           </a:p>
@@ -4652,7 +4824,7 @@
           <a:p>
             <a:fld id="{C62B3463-61C8-4819-BC9A-C94FD847F060}" type="datetimeFigureOut">
               <a:rPr lang="en-US" smtClean="0"/>
-              <a:t>4/8/2023</a:t>
+              <a:t>4/10/2023</a:t>
             </a:fld>
             <a:endParaRPr lang="en-US"/>
           </a:p>
@@ -4793,7 +4965,7 @@
           <a:p>
             <a:fld id="{C62B3463-61C8-4819-BC9A-C94FD847F060}" type="datetimeFigureOut">
               <a:rPr lang="en-US" smtClean="0"/>
-              <a:t>4/8/2023</a:t>
+              <a:t>4/10/2023</a:t>
             </a:fld>
             <a:endParaRPr lang="en-US"/>
           </a:p>
@@ -4906,7 +5078,7 @@
           <a:p>
             <a:fld id="{C62B3463-61C8-4819-BC9A-C94FD847F060}" type="datetimeFigureOut">
               <a:rPr lang="en-US" smtClean="0"/>
-              <a:t>4/8/2023</a:t>
+              <a:t>4/10/2023</a:t>
             </a:fld>
             <a:endParaRPr lang="en-US"/>
           </a:p>
@@ -5217,7 +5389,7 @@
           <a:p>
             <a:fld id="{C62B3463-61C8-4819-BC9A-C94FD847F060}" type="datetimeFigureOut">
               <a:rPr lang="en-US" smtClean="0"/>
-              <a:t>4/8/2023</a:t>
+              <a:t>4/10/2023</a:t>
             </a:fld>
             <a:endParaRPr lang="en-US"/>
           </a:p>
@@ -5505,7 +5677,7 @@
           <a:p>
             <a:fld id="{C62B3463-61C8-4819-BC9A-C94FD847F060}" type="datetimeFigureOut">
               <a:rPr lang="en-US" smtClean="0"/>
-              <a:t>4/8/2023</a:t>
+              <a:t>4/10/2023</a:t>
             </a:fld>
             <a:endParaRPr lang="en-US"/>
           </a:p>
@@ -5746,7 +5918,7 @@
           <a:p>
             <a:fld id="{C62B3463-61C8-4819-BC9A-C94FD847F060}" type="datetimeFigureOut">
               <a:rPr lang="en-US" smtClean="0"/>
-              <a:t>4/8/2023</a:t>
+              <a:t>4/10/2023</a:t>
             </a:fld>
             <a:endParaRPr lang="en-US"/>
           </a:p>
@@ -6842,7 +7014,15 @@
           <a:p>
             <a:r>
               <a:rPr lang="en-US" sz="1100" dirty="0"/>
-              <a:t>Copyright 2020,2021, 2022, Stephen F Elston. All rights reserved.</a:t>
+              <a:t>Copyright 2020,2021</a:t>
+            </a:r>
+            <a:r>
+              <a:rPr lang="en-US" sz="1100"/>
+              <a:t>, 2022, 2023, </a:t>
+            </a:r>
+            <a:r>
+              <a:rPr lang="en-US" sz="1100" dirty="0"/>
+              <a:t>Stephen F Elston. All rights reserved.</a:t>
             </a:r>
           </a:p>
           <a:p>
@@ -14755,8 +14935,8 @@
           </a:p>
         </p:txBody>
       </p:sp>
-      <mc:AlternateContent xmlns:mc="http://schemas.openxmlformats.org/markup-compatibility/2006">
-        <mc:Choice xmlns:a14="http://schemas.microsoft.com/office/drawing/2010/main" Requires="a14">
+      <mc:AlternateContent xmlns:mc="http://schemas.openxmlformats.org/markup-compatibility/2006" xmlns:a14="http://schemas.microsoft.com/office/drawing/2010/main">
+        <mc:Choice Requires="a14">
           <p:sp>
             <p:nvSpPr>
               <p:cNvPr id="3" name="Content Placeholder 2">
@@ -15846,7 +16026,7 @@
             </p:txBody>
           </p:sp>
         </mc:Choice>
-        <mc:Fallback>
+        <mc:Fallback xmlns="">
           <p:sp>
             <p:nvSpPr>
               <p:cNvPr id="3" name="Content Placeholder 2">
@@ -17350,8 +17530,8 @@
           </a:p>
         </p:txBody>
       </p:sp>
-      <mc:AlternateContent xmlns:mc="http://schemas.openxmlformats.org/markup-compatibility/2006">
-        <mc:Choice xmlns:a14="http://schemas.microsoft.com/office/drawing/2010/main" Requires="a14">
+      <mc:AlternateContent xmlns:mc="http://schemas.openxmlformats.org/markup-compatibility/2006" xmlns:a14="http://schemas.microsoft.com/office/drawing/2010/main">
+        <mc:Choice Requires="a14">
           <p:sp>
             <p:nvSpPr>
               <p:cNvPr id="3" name="Content Placeholder 2">
@@ -17755,7 +17935,7 @@
             </p:txBody>
           </p:sp>
         </mc:Choice>
-        <mc:Fallback>
+        <mc:Fallback xmlns="">
           <p:sp>
             <p:nvSpPr>
               <p:cNvPr id="3" name="Content Placeholder 2">
@@ -19546,8 +19726,8 @@
           </a:p>
         </p:txBody>
       </p:sp>
-      <mc:AlternateContent xmlns:mc="http://schemas.openxmlformats.org/markup-compatibility/2006">
-        <mc:Choice xmlns:a14="http://schemas.microsoft.com/office/drawing/2010/main" Requires="a14">
+      <mc:AlternateContent xmlns:mc="http://schemas.openxmlformats.org/markup-compatibility/2006" xmlns:a14="http://schemas.microsoft.com/office/drawing/2010/main">
+        <mc:Choice Requires="a14">
           <p:sp>
             <p:nvSpPr>
               <p:cNvPr id="3" name="Content Placeholder 2">
@@ -20091,7 +20271,7 @@
             </p:txBody>
           </p:sp>
         </mc:Choice>
-        <mc:Fallback>
+        <mc:Fallback xmlns="">
           <p:sp>
             <p:nvSpPr>
               <p:cNvPr id="3" name="Content Placeholder 2">
@@ -21012,6 +21192,854 @@
       </p:grpSpPr>
       <p:sp>
         <p:nvSpPr>
+          <p:cNvPr id="2" name="Title 1"/>
+          <p:cNvSpPr>
+            <a:spLocks noGrp="1"/>
+          </p:cNvSpPr>
+          <p:nvPr>
+            <p:ph type="title"/>
+          </p:nvPr>
+        </p:nvSpPr>
+        <p:spPr>
+          <a:xfrm>
+            <a:off x="584200" y="221992"/>
+            <a:ext cx="10515600" cy="530954"/>
+          </a:xfrm>
+        </p:spPr>
+        <p:txBody>
+          <a:bodyPr>
+            <a:noAutofit/>
+          </a:bodyPr>
+          <a:lstStyle/>
+          <a:p>
+            <a:r>
+              <a:rPr lang="en-US" sz="3600" dirty="0"/>
+              <a:t>Principle Component Decomposition</a:t>
+            </a:r>
+          </a:p>
+        </p:txBody>
+      </p:sp>
+      <mc:AlternateContent xmlns:mc="http://schemas.openxmlformats.org/markup-compatibility/2006">
+        <mc:Choice xmlns:a14="http://schemas.microsoft.com/office/drawing/2010/main" Requires="a14">
+          <p:sp>
+            <p:nvSpPr>
+              <p:cNvPr id="3" name="Content Placeholder 2"/>
+              <p:cNvSpPr>
+                <a:spLocks noGrp="1"/>
+              </p:cNvSpPr>
+              <p:nvPr>
+                <p:ph sz="quarter" idx="10"/>
+              </p:nvPr>
+            </p:nvSpPr>
+            <p:spPr>
+              <a:xfrm>
+                <a:off x="333375" y="1004777"/>
+                <a:ext cx="11525250" cy="5181690"/>
+              </a:xfrm>
+            </p:spPr>
+            <p:txBody>
+              <a:bodyPr>
+                <a:normAutofit/>
+              </a:bodyPr>
+              <a:lstStyle/>
+              <a:p>
+                <a:pPr marL="0" indent="0">
+                  <a:buNone/>
+                </a:pPr>
+                <a:r>
+                  <a:rPr lang="en-US" dirty="0">
+                    <a:latin typeface="+mn-lt"/>
+                  </a:rPr>
+                  <a:t>What are the properties of principle component decomposition?</a:t>
+                </a:r>
+              </a:p>
+              <a:p>
+                <a:r>
+                  <a:rPr lang="en-US" dirty="0">
+                    <a:latin typeface="+mn-lt"/>
+                  </a:rPr>
+                  <a:t>PCA is a linear projection from high dimensional space to low dimensional space</a:t>
+                </a:r>
+              </a:p>
+              <a:p>
+                <a:pPr marL="0" indent="0">
+                  <a:buNone/>
+                </a:pPr>
+                <a14:m>
+                  <m:oMathPara xmlns:m="http://schemas.openxmlformats.org/officeDocument/2006/math">
+                    <m:oMathParaPr>
+                      <m:jc m:val="centerGroup"/>
+                    </m:oMathParaPr>
+                    <m:oMath xmlns:m="http://schemas.openxmlformats.org/officeDocument/2006/math">
+                      <m:r>
+                        <a:rPr lang="en-US" i="1">
+                          <a:latin typeface="Cambria Math" panose="02040503050406030204" pitchFamily="18" charset="0"/>
+                          <a:cs typeface="Segoe UI" panose="020B0502040204020203" pitchFamily="34" charset="0"/>
+                        </a:rPr>
+                        <m:t>𝑇</m:t>
+                      </m:r>
+                      <m:r>
+                        <a:rPr lang="en-US" i="1">
+                          <a:latin typeface="Cambria Math" panose="02040503050406030204" pitchFamily="18" charset="0"/>
+                          <a:cs typeface="Segoe UI" panose="020B0502040204020203" pitchFamily="34" charset="0"/>
+                        </a:rPr>
+                        <m:t>=</m:t>
+                      </m:r>
+                      <m:r>
+                        <a:rPr lang="en-US" i="1">
+                          <a:latin typeface="Cambria Math" panose="02040503050406030204" pitchFamily="18" charset="0"/>
+                          <a:cs typeface="Segoe UI" panose="020B0502040204020203" pitchFamily="34" charset="0"/>
+                        </a:rPr>
+                        <m:t>𝑋𝑊</m:t>
+                      </m:r>
+                      <m:r>
+                        <a:rPr lang="en-US" b="0" i="1" smtClean="0">
+                          <a:latin typeface="Cambria Math" panose="02040503050406030204" pitchFamily="18" charset="0"/>
+                          <a:cs typeface="Segoe UI" panose="020B0502040204020203" pitchFamily="34" charset="0"/>
+                        </a:rPr>
+                        <m:t> </m:t>
+                      </m:r>
+                      <m:r>
+                        <a:rPr lang="en-US" b="0" i="1" smtClean="0">
+                          <a:latin typeface="Cambria Math" panose="02040503050406030204" pitchFamily="18" charset="0"/>
+                          <a:cs typeface="Segoe UI" panose="020B0502040204020203" pitchFamily="34" charset="0"/>
+                        </a:rPr>
+                        <m:t>𝑓𝑜𝑟</m:t>
+                      </m:r>
+                      <m:r>
+                        <a:rPr lang="en-US" b="0" i="1" smtClean="0">
+                          <a:latin typeface="Cambria Math" panose="02040503050406030204" pitchFamily="18" charset="0"/>
+                          <a:cs typeface="Segoe UI" panose="020B0502040204020203" pitchFamily="34" charset="0"/>
+                        </a:rPr>
+                        <m:t> </m:t>
+                      </m:r>
+                      <m:r>
+                        <a:rPr lang="en-US" b="0" i="1" smtClean="0">
+                          <a:latin typeface="Cambria Math" panose="02040503050406030204" pitchFamily="18" charset="0"/>
+                          <a:cs typeface="Segoe UI" panose="020B0502040204020203" pitchFamily="34" charset="0"/>
+                        </a:rPr>
+                        <m:t>𝑋</m:t>
+                      </m:r>
+                      <m:r>
+                        <a:rPr lang="en-US" b="0" i="1" smtClean="0">
+                          <a:latin typeface="Cambria Math" panose="02040503050406030204" pitchFamily="18" charset="0"/>
+                          <a:cs typeface="Segoe UI" panose="020B0502040204020203" pitchFamily="34" charset="0"/>
+                        </a:rPr>
+                        <m:t> </m:t>
+                      </m:r>
+                      <m:r>
+                        <a:rPr lang="en-US" b="0" i="1" smtClean="0">
+                          <a:latin typeface="Cambria Math" panose="02040503050406030204" pitchFamily="18" charset="0"/>
+                          <a:cs typeface="Segoe UI" panose="020B0502040204020203" pitchFamily="34" charset="0"/>
+                        </a:rPr>
+                        <m:t>𝑖𝑛</m:t>
+                      </m:r>
+                      <m:r>
+                        <a:rPr lang="en-US" b="0" i="1" smtClean="0">
+                          <a:latin typeface="Cambria Math" panose="02040503050406030204" pitchFamily="18" charset="0"/>
+                          <a:cs typeface="Segoe UI" panose="020B0502040204020203" pitchFamily="34" charset="0"/>
+                        </a:rPr>
+                        <m:t> </m:t>
+                      </m:r>
+                      <m:sSup>
+                        <m:sSupPr>
+                          <m:ctrlPr>
+                            <a:rPr lang="en-US" b="0" i="1" smtClean="0">
+                              <a:latin typeface="Cambria Math" panose="02040503050406030204" pitchFamily="18" charset="0"/>
+                              <a:cs typeface="Segoe UI" panose="020B0502040204020203" pitchFamily="34" charset="0"/>
+                            </a:rPr>
+                          </m:ctrlPr>
+                        </m:sSupPr>
+                        <m:e>
+                          <m:r>
+                            <a:rPr lang="en-US" b="0" i="1" smtClean="0">
+                              <a:latin typeface="Cambria Math" panose="02040503050406030204" pitchFamily="18" charset="0"/>
+                              <a:ea typeface="Cambria Math" panose="02040503050406030204" pitchFamily="18" charset="0"/>
+                              <a:cs typeface="Segoe UI" panose="020B0502040204020203" pitchFamily="34" charset="0"/>
+                            </a:rPr>
+                            <m:t>ℝ</m:t>
+                          </m:r>
+                        </m:e>
+                        <m:sup>
+                          <m:r>
+                            <a:rPr lang="en-US" b="0" i="1" smtClean="0">
+                              <a:latin typeface="Cambria Math" panose="02040503050406030204" pitchFamily="18" charset="0"/>
+                              <a:cs typeface="Segoe UI" panose="020B0502040204020203" pitchFamily="34" charset="0"/>
+                            </a:rPr>
+                            <m:t>𝑛</m:t>
+                          </m:r>
+                        </m:sup>
+                      </m:sSup>
+                      <m:r>
+                        <a:rPr lang="en-US" b="0" i="1" smtClean="0">
+                          <a:latin typeface="Cambria Math" panose="02040503050406030204" pitchFamily="18" charset="0"/>
+                          <a:cs typeface="Segoe UI" panose="020B0502040204020203" pitchFamily="34" charset="0"/>
+                        </a:rPr>
+                        <m:t> </m:t>
+                      </m:r>
+                      <m:r>
+                        <a:rPr lang="en-US" b="0" i="1" smtClean="0">
+                          <a:latin typeface="Cambria Math" panose="02040503050406030204" pitchFamily="18" charset="0"/>
+                          <a:cs typeface="Segoe UI" panose="020B0502040204020203" pitchFamily="34" charset="0"/>
+                        </a:rPr>
+                        <m:t>𝑇</m:t>
+                      </m:r>
+                      <m:r>
+                        <a:rPr lang="en-US" b="0" i="1" smtClean="0">
+                          <a:latin typeface="Cambria Math" panose="02040503050406030204" pitchFamily="18" charset="0"/>
+                          <a:cs typeface="Segoe UI" panose="020B0502040204020203" pitchFamily="34" charset="0"/>
+                        </a:rPr>
+                        <m:t> </m:t>
+                      </m:r>
+                      <m:r>
+                        <a:rPr lang="en-US" b="0" i="1" smtClean="0">
+                          <a:latin typeface="Cambria Math" panose="02040503050406030204" pitchFamily="18" charset="0"/>
+                          <a:cs typeface="Segoe UI" panose="020B0502040204020203" pitchFamily="34" charset="0"/>
+                        </a:rPr>
+                        <m:t>𝑖𝑛</m:t>
+                      </m:r>
+                      <m:r>
+                        <a:rPr lang="en-US" b="0" i="1" smtClean="0">
+                          <a:latin typeface="Cambria Math" panose="02040503050406030204" pitchFamily="18" charset="0"/>
+                          <a:cs typeface="Segoe UI" panose="020B0502040204020203" pitchFamily="34" charset="0"/>
+                        </a:rPr>
+                        <m:t> </m:t>
+                      </m:r>
+                      <m:sSup>
+                        <m:sSupPr>
+                          <m:ctrlPr>
+                            <a:rPr lang="en-US" b="0" i="1" smtClean="0">
+                              <a:latin typeface="Cambria Math" panose="02040503050406030204" pitchFamily="18" charset="0"/>
+                              <a:cs typeface="Segoe UI" panose="020B0502040204020203" pitchFamily="34" charset="0"/>
+                            </a:rPr>
+                          </m:ctrlPr>
+                        </m:sSupPr>
+                        <m:e>
+                          <m:r>
+                            <a:rPr lang="en-US" b="0" i="1" smtClean="0">
+                              <a:latin typeface="Cambria Math" panose="02040503050406030204" pitchFamily="18" charset="0"/>
+                              <a:ea typeface="Cambria Math" panose="02040503050406030204" pitchFamily="18" charset="0"/>
+                              <a:cs typeface="Segoe UI" panose="020B0502040204020203" pitchFamily="34" charset="0"/>
+                            </a:rPr>
+                            <m:t>ℝ</m:t>
+                          </m:r>
+                        </m:e>
+                        <m:sup>
+                          <m:r>
+                            <a:rPr lang="en-US" b="0" i="1" smtClean="0">
+                              <a:latin typeface="Cambria Math" panose="02040503050406030204" pitchFamily="18" charset="0"/>
+                              <a:cs typeface="Segoe UI" panose="020B0502040204020203" pitchFamily="34" charset="0"/>
+                            </a:rPr>
+                            <m:t>𝑙</m:t>
+                          </m:r>
+                        </m:sup>
+                      </m:sSup>
+                      <m:r>
+                        <a:rPr lang="en-US" b="0" i="1" smtClean="0">
+                          <a:latin typeface="Cambria Math" panose="02040503050406030204" pitchFamily="18" charset="0"/>
+                          <a:cs typeface="Segoe UI" panose="020B0502040204020203" pitchFamily="34" charset="0"/>
+                        </a:rPr>
+                        <m:t>, </m:t>
+                      </m:r>
+                      <m:r>
+                        <a:rPr lang="en-US" b="0" i="1" smtClean="0">
+                          <a:latin typeface="Cambria Math" panose="02040503050406030204" pitchFamily="18" charset="0"/>
+                          <a:cs typeface="Segoe UI" panose="020B0502040204020203" pitchFamily="34" charset="0"/>
+                        </a:rPr>
+                        <m:t>𝑛</m:t>
+                      </m:r>
+                      <m:r>
+                        <a:rPr lang="en-US" b="0" i="1" smtClean="0">
+                          <a:latin typeface="Cambria Math" panose="02040503050406030204" pitchFamily="18" charset="0"/>
+                          <a:ea typeface="Cambria Math" panose="02040503050406030204" pitchFamily="18" charset="0"/>
+                          <a:cs typeface="Segoe UI" panose="020B0502040204020203" pitchFamily="34" charset="0"/>
+                        </a:rPr>
+                        <m:t>≫</m:t>
+                      </m:r>
+                      <m:r>
+                        <a:rPr lang="en-US" b="0" i="1" smtClean="0">
+                          <a:latin typeface="Cambria Math" panose="02040503050406030204" pitchFamily="18" charset="0"/>
+                          <a:ea typeface="Cambria Math" panose="02040503050406030204" pitchFamily="18" charset="0"/>
+                          <a:cs typeface="Segoe UI" panose="020B0502040204020203" pitchFamily="34" charset="0"/>
+                        </a:rPr>
+                        <m:t>𝑙</m:t>
+                      </m:r>
+                      <m:r>
+                        <a:rPr lang="en-US" b="0" i="1" smtClean="0">
+                          <a:latin typeface="Cambria Math" panose="02040503050406030204" pitchFamily="18" charset="0"/>
+                          <a:cs typeface="Segoe UI" panose="020B0502040204020203" pitchFamily="34" charset="0"/>
+                        </a:rPr>
+                        <m:t> </m:t>
+                      </m:r>
+                    </m:oMath>
+                  </m:oMathPara>
+                </a14:m>
+                <a:endParaRPr lang="en-US" dirty="0">
+                  <a:latin typeface="+mn-lt"/>
+                </a:endParaRPr>
+              </a:p>
+              <a:p>
+                <a:pPr lvl="1"/>
+                <a:r>
+                  <a:rPr lang="en-US" dirty="0">
+                    <a:latin typeface="+mn-lt"/>
+                  </a:rPr>
+                  <a:t>A good more only if </a:t>
+                </a:r>
+                <a:r>
+                  <a:rPr lang="en-US" b="1" dirty="0">
+                    <a:latin typeface="+mn-lt"/>
+                  </a:rPr>
+                  <a:t>dependency between variables is linear and constant   </a:t>
+                </a:r>
+              </a:p>
+              <a:p>
+                <a:r>
+                  <a:rPr lang="en-US" dirty="0">
+                    <a:latin typeface="+mn-lt"/>
+                  </a:rPr>
+                  <a:t>PCA </a:t>
+                </a:r>
+                <a:r>
+                  <a:rPr lang="en-US" b="1" dirty="0">
+                    <a:latin typeface="+mn-lt"/>
+                  </a:rPr>
+                  <a:t>minimizes least square error </a:t>
+                </a:r>
+                <a:r>
+                  <a:rPr lang="en-US" dirty="0">
+                    <a:latin typeface="+mn-lt"/>
+                  </a:rPr>
+                  <a:t>with original data  </a:t>
+                </a:r>
+              </a:p>
+              <a:p>
+                <a:pPr lvl="1"/>
+                <a:r>
+                  <a:rPr lang="en-US" dirty="0">
+                    <a:latin typeface="+mn-lt"/>
+                  </a:rPr>
+                  <a:t>Appropriate only for </a:t>
+                </a:r>
+                <a:r>
+                  <a:rPr lang="en-US" b="1" dirty="0">
+                    <a:latin typeface="+mn-lt"/>
+                  </a:rPr>
+                  <a:t>Euclidean space  </a:t>
+                </a:r>
+              </a:p>
+              <a:p>
+                <a:r>
+                  <a:rPr lang="en-US" dirty="0">
+                    <a:latin typeface="+mn-lt"/>
+                  </a:rPr>
+                  <a:t>PCA </a:t>
+                </a:r>
+                <a:r>
+                  <a:rPr lang="en-US" b="1" dirty="0">
+                    <a:latin typeface="+mn-lt"/>
+                  </a:rPr>
+                  <a:t>approximately preserves distances</a:t>
+                </a:r>
+              </a:p>
+              <a:p>
+                <a:pPr lvl="1"/>
+                <a:r>
+                  <a:rPr lang="en-US" dirty="0">
+                    <a:latin typeface="+mn-lt"/>
+                  </a:rPr>
+                  <a:t>Distances are preserved within the error of the linear transformation  </a:t>
+                </a:r>
+              </a:p>
+              <a:p>
+                <a:r>
+                  <a:rPr lang="en-US" dirty="0">
+                    <a:latin typeface="+mn-lt"/>
+                  </a:rPr>
+                  <a:t>PCA is a fast and efficient algorithm </a:t>
+                </a:r>
+              </a:p>
+              <a:p>
+                <a:pPr lvl="1"/>
+                <a:r>
+                  <a:rPr lang="en-US" dirty="0">
+                    <a:latin typeface="+mn-lt"/>
+                  </a:rPr>
+                  <a:t>Only need to find </a:t>
+                </a:r>
+                <a:r>
+                  <a:rPr lang="en-US" i="1" dirty="0">
+                    <a:latin typeface="+mn-lt"/>
+                  </a:rPr>
+                  <a:t>l</a:t>
+                </a:r>
+                <a:r>
+                  <a:rPr lang="en-US" dirty="0">
+                    <a:latin typeface="+mn-lt"/>
+                  </a:rPr>
+                  <a:t> eigenvalues </a:t>
+                </a:r>
+              </a:p>
+              <a:p>
+                <a:pPr lvl="1"/>
+                <a:endParaRPr lang="en-US" dirty="0">
+                  <a:latin typeface="+mn-lt"/>
+                </a:endParaRPr>
+              </a:p>
+            </p:txBody>
+          </p:sp>
+        </mc:Choice>
+        <mc:Fallback>
+          <p:sp>
+            <p:nvSpPr>
+              <p:cNvPr id="3" name="Content Placeholder 2"/>
+              <p:cNvSpPr>
+                <a:spLocks noGrp="1" noRot="1" noChangeAspect="1" noMove="1" noResize="1" noEditPoints="1" noAdjustHandles="1" noChangeArrowheads="1" noChangeShapeType="1" noTextEdit="1"/>
+              </p:cNvSpPr>
+              <p:nvPr>
+                <p:ph sz="quarter" idx="10"/>
+              </p:nvPr>
+            </p:nvSpPr>
+            <p:spPr>
+              <a:xfrm>
+                <a:off x="333375" y="1004777"/>
+                <a:ext cx="11525250" cy="5181690"/>
+              </a:xfrm>
+              <a:blipFill>
+                <a:blip r:embed="rId3"/>
+                <a:stretch>
+                  <a:fillRect l="-1111" t="-2000" b="-471"/>
+                </a:stretch>
+              </a:blipFill>
+            </p:spPr>
+            <p:txBody>
+              <a:bodyPr/>
+              <a:lstStyle/>
+              <a:p>
+                <a:r>
+                  <a:rPr lang="en-US">
+                    <a:noFill/>
+                  </a:rPr>
+                  <a:t> </a:t>
+                </a:r>
+              </a:p>
+            </p:txBody>
+          </p:sp>
+        </mc:Fallback>
+      </mc:AlternateContent>
+    </p:spTree>
+    <p:extLst>
+      <p:ext uri="{BB962C8B-B14F-4D97-AF65-F5344CB8AC3E}">
+        <p14:creationId xmlns:p14="http://schemas.microsoft.com/office/powerpoint/2010/main" val="1130230934"/>
+      </p:ext>
+    </p:extLst>
+  </p:cSld>
+  <p:clrMapOvr>
+    <a:masterClrMapping/>
+  </p:clrMapOvr>
+  <p:timing>
+    <p:tnLst>
+      <p:par>
+        <p:cTn id="1" dur="indefinite" restart="never" nodeType="tmRoot">
+          <p:childTnLst>
+            <p:seq concurrent="1" nextAc="seek">
+              <p:cTn id="2" dur="indefinite" nodeType="mainSeq">
+                <p:childTnLst>
+                  <p:par>
+                    <p:cTn id="3" fill="hold">
+                      <p:stCondLst>
+                        <p:cond delay="indefinite"/>
+                      </p:stCondLst>
+                      <p:childTnLst>
+                        <p:par>
+                          <p:cTn id="4" fill="hold">
+                            <p:stCondLst>
+                              <p:cond delay="0"/>
+                            </p:stCondLst>
+                            <p:childTnLst>
+                              <p:par>
+                                <p:cTn id="5" presetID="1" presetClass="entr" presetSubtype="0" fill="hold" nodeType="clickEffect">
+                                  <p:stCondLst>
+                                    <p:cond delay="0"/>
+                                  </p:stCondLst>
+                                  <p:childTnLst>
+                                    <p:set>
+                                      <p:cBhvr>
+                                        <p:cTn id="6" dur="1" fill="hold">
+                                          <p:stCondLst>
+                                            <p:cond delay="0"/>
+                                          </p:stCondLst>
+                                        </p:cTn>
+                                        <p:tgtEl>
+                                          <p:spTgt spid="3">
+                                            <p:txEl>
+                                              <p:pRg st="1" end="1"/>
+                                            </p:txEl>
+                                          </p:spTgt>
+                                        </p:tgtEl>
+                                        <p:attrNameLst>
+                                          <p:attrName>style.visibility</p:attrName>
+                                        </p:attrNameLst>
+                                      </p:cBhvr>
+                                      <p:to>
+                                        <p:strVal val="visible"/>
+                                      </p:to>
+                                    </p:set>
+                                  </p:childTnLst>
+                                </p:cTn>
+                              </p:par>
+                              <p:par>
+                                <p:cTn id="7" presetID="1" presetClass="entr" presetSubtype="0" fill="hold" nodeType="withEffect">
+                                  <p:stCondLst>
+                                    <p:cond delay="0"/>
+                                  </p:stCondLst>
+                                  <p:childTnLst>
+                                    <p:set>
+                                      <p:cBhvr>
+                                        <p:cTn id="8" dur="1" fill="hold">
+                                          <p:stCondLst>
+                                            <p:cond delay="0"/>
+                                          </p:stCondLst>
+                                        </p:cTn>
+                                        <p:tgtEl>
+                                          <p:spTgt spid="3">
+                                            <p:txEl>
+                                              <p:pRg st="2" end="2"/>
+                                            </p:txEl>
+                                          </p:spTgt>
+                                        </p:tgtEl>
+                                        <p:attrNameLst>
+                                          <p:attrName>style.visibility</p:attrName>
+                                        </p:attrNameLst>
+                                      </p:cBhvr>
+                                      <p:to>
+                                        <p:strVal val="visible"/>
+                                      </p:to>
+                                    </p:set>
+                                  </p:childTnLst>
+                                </p:cTn>
+                              </p:par>
+                              <p:par>
+                                <p:cTn id="9" presetID="1" presetClass="entr" presetSubtype="0" fill="hold" nodeType="withEffect">
+                                  <p:stCondLst>
+                                    <p:cond delay="0"/>
+                                  </p:stCondLst>
+                                  <p:childTnLst>
+                                    <p:set>
+                                      <p:cBhvr>
+                                        <p:cTn id="10" dur="1" fill="hold">
+                                          <p:stCondLst>
+                                            <p:cond delay="0"/>
+                                          </p:stCondLst>
+                                        </p:cTn>
+                                        <p:tgtEl>
+                                          <p:spTgt spid="3">
+                                            <p:txEl>
+                                              <p:pRg st="3" end="3"/>
+                                            </p:txEl>
+                                          </p:spTgt>
+                                        </p:tgtEl>
+                                        <p:attrNameLst>
+                                          <p:attrName>style.visibility</p:attrName>
+                                        </p:attrNameLst>
+                                      </p:cBhvr>
+                                      <p:to>
+                                        <p:strVal val="visible"/>
+                                      </p:to>
+                                    </p:set>
+                                  </p:childTnLst>
+                                </p:cTn>
+                              </p:par>
+                            </p:childTnLst>
+                          </p:cTn>
+                        </p:par>
+                      </p:childTnLst>
+                    </p:cTn>
+                  </p:par>
+                  <p:par>
+                    <p:cTn id="11" fill="hold">
+                      <p:stCondLst>
+                        <p:cond delay="indefinite"/>
+                      </p:stCondLst>
+                      <p:childTnLst>
+                        <p:par>
+                          <p:cTn id="12" fill="hold">
+                            <p:stCondLst>
+                              <p:cond delay="0"/>
+                            </p:stCondLst>
+                            <p:childTnLst>
+                              <p:par>
+                                <p:cTn id="13" presetID="1" presetClass="entr" presetSubtype="0" fill="hold" nodeType="clickEffect">
+                                  <p:stCondLst>
+                                    <p:cond delay="0"/>
+                                  </p:stCondLst>
+                                  <p:childTnLst>
+                                    <p:set>
+                                      <p:cBhvr>
+                                        <p:cTn id="14" dur="1" fill="hold">
+                                          <p:stCondLst>
+                                            <p:cond delay="0"/>
+                                          </p:stCondLst>
+                                        </p:cTn>
+                                        <p:tgtEl>
+                                          <p:spTgt spid="3">
+                                            <p:txEl>
+                                              <p:pRg st="4" end="4"/>
+                                            </p:txEl>
+                                          </p:spTgt>
+                                        </p:tgtEl>
+                                        <p:attrNameLst>
+                                          <p:attrName>style.visibility</p:attrName>
+                                        </p:attrNameLst>
+                                      </p:cBhvr>
+                                      <p:to>
+                                        <p:strVal val="visible"/>
+                                      </p:to>
+                                    </p:set>
+                                  </p:childTnLst>
+                                </p:cTn>
+                              </p:par>
+                              <p:par>
+                                <p:cTn id="15" presetID="1" presetClass="entr" presetSubtype="0" fill="hold" nodeType="withEffect">
+                                  <p:stCondLst>
+                                    <p:cond delay="0"/>
+                                  </p:stCondLst>
+                                  <p:childTnLst>
+                                    <p:set>
+                                      <p:cBhvr>
+                                        <p:cTn id="16" dur="1" fill="hold">
+                                          <p:stCondLst>
+                                            <p:cond delay="0"/>
+                                          </p:stCondLst>
+                                        </p:cTn>
+                                        <p:tgtEl>
+                                          <p:spTgt spid="3">
+                                            <p:txEl>
+                                              <p:pRg st="5" end="5"/>
+                                            </p:txEl>
+                                          </p:spTgt>
+                                        </p:tgtEl>
+                                        <p:attrNameLst>
+                                          <p:attrName>style.visibility</p:attrName>
+                                        </p:attrNameLst>
+                                      </p:cBhvr>
+                                      <p:to>
+                                        <p:strVal val="visible"/>
+                                      </p:to>
+                                    </p:set>
+                                  </p:childTnLst>
+                                </p:cTn>
+                              </p:par>
+                            </p:childTnLst>
+                          </p:cTn>
+                        </p:par>
+                      </p:childTnLst>
+                    </p:cTn>
+                  </p:par>
+                  <p:par>
+                    <p:cTn id="17" fill="hold">
+                      <p:stCondLst>
+                        <p:cond delay="indefinite"/>
+                      </p:stCondLst>
+                      <p:childTnLst>
+                        <p:par>
+                          <p:cTn id="18" fill="hold">
+                            <p:stCondLst>
+                              <p:cond delay="0"/>
+                            </p:stCondLst>
+                            <p:childTnLst>
+                              <p:par>
+                                <p:cTn id="19" presetID="1" presetClass="entr" presetSubtype="0" fill="hold" nodeType="clickEffect">
+                                  <p:stCondLst>
+                                    <p:cond delay="0"/>
+                                  </p:stCondLst>
+                                  <p:childTnLst>
+                                    <p:set>
+                                      <p:cBhvr>
+                                        <p:cTn id="20" dur="1" fill="hold">
+                                          <p:stCondLst>
+                                            <p:cond delay="0"/>
+                                          </p:stCondLst>
+                                        </p:cTn>
+                                        <p:tgtEl>
+                                          <p:spTgt spid="3">
+                                            <p:txEl>
+                                              <p:pRg st="6" end="6"/>
+                                            </p:txEl>
+                                          </p:spTgt>
+                                        </p:tgtEl>
+                                        <p:attrNameLst>
+                                          <p:attrName>style.visibility</p:attrName>
+                                        </p:attrNameLst>
+                                      </p:cBhvr>
+                                      <p:to>
+                                        <p:strVal val="visible"/>
+                                      </p:to>
+                                    </p:set>
+                                  </p:childTnLst>
+                                </p:cTn>
+                              </p:par>
+                              <p:par>
+                                <p:cTn id="21" presetID="1" presetClass="entr" presetSubtype="0" fill="hold" nodeType="withEffect">
+                                  <p:stCondLst>
+                                    <p:cond delay="0"/>
+                                  </p:stCondLst>
+                                  <p:childTnLst>
+                                    <p:set>
+                                      <p:cBhvr>
+                                        <p:cTn id="22" dur="1" fill="hold">
+                                          <p:stCondLst>
+                                            <p:cond delay="0"/>
+                                          </p:stCondLst>
+                                        </p:cTn>
+                                        <p:tgtEl>
+                                          <p:spTgt spid="3">
+                                            <p:txEl>
+                                              <p:pRg st="7" end="7"/>
+                                            </p:txEl>
+                                          </p:spTgt>
+                                        </p:tgtEl>
+                                        <p:attrNameLst>
+                                          <p:attrName>style.visibility</p:attrName>
+                                        </p:attrNameLst>
+                                      </p:cBhvr>
+                                      <p:to>
+                                        <p:strVal val="visible"/>
+                                      </p:to>
+                                    </p:set>
+                                  </p:childTnLst>
+                                </p:cTn>
+                              </p:par>
+                            </p:childTnLst>
+                          </p:cTn>
+                        </p:par>
+                      </p:childTnLst>
+                    </p:cTn>
+                  </p:par>
+                  <p:par>
+                    <p:cTn id="23" fill="hold">
+                      <p:stCondLst>
+                        <p:cond delay="indefinite"/>
+                      </p:stCondLst>
+                      <p:childTnLst>
+                        <p:par>
+                          <p:cTn id="24" fill="hold">
+                            <p:stCondLst>
+                              <p:cond delay="0"/>
+                            </p:stCondLst>
+                            <p:childTnLst>
+                              <p:par>
+                                <p:cTn id="25" presetID="1" presetClass="entr" presetSubtype="0" fill="hold" nodeType="clickEffect">
+                                  <p:stCondLst>
+                                    <p:cond delay="0"/>
+                                  </p:stCondLst>
+                                  <p:childTnLst>
+                                    <p:set>
+                                      <p:cBhvr>
+                                        <p:cTn id="26" dur="1" fill="hold">
+                                          <p:stCondLst>
+                                            <p:cond delay="0"/>
+                                          </p:stCondLst>
+                                        </p:cTn>
+                                        <p:tgtEl>
+                                          <p:spTgt spid="3">
+                                            <p:txEl>
+                                              <p:pRg st="8" end="8"/>
+                                            </p:txEl>
+                                          </p:spTgt>
+                                        </p:tgtEl>
+                                        <p:attrNameLst>
+                                          <p:attrName>style.visibility</p:attrName>
+                                        </p:attrNameLst>
+                                      </p:cBhvr>
+                                      <p:to>
+                                        <p:strVal val="visible"/>
+                                      </p:to>
+                                    </p:set>
+                                  </p:childTnLst>
+                                </p:cTn>
+                              </p:par>
+                              <p:par>
+                                <p:cTn id="27" presetID="1" presetClass="entr" presetSubtype="0" fill="hold" nodeType="withEffect">
+                                  <p:stCondLst>
+                                    <p:cond delay="0"/>
+                                  </p:stCondLst>
+                                  <p:childTnLst>
+                                    <p:set>
+                                      <p:cBhvr>
+                                        <p:cTn id="28" dur="1" fill="hold">
+                                          <p:stCondLst>
+                                            <p:cond delay="0"/>
+                                          </p:stCondLst>
+                                        </p:cTn>
+                                        <p:tgtEl>
+                                          <p:spTgt spid="3">
+                                            <p:txEl>
+                                              <p:pRg st="9" end="9"/>
+                                            </p:txEl>
+                                          </p:spTgt>
+                                        </p:tgtEl>
+                                        <p:attrNameLst>
+                                          <p:attrName>style.visibility</p:attrName>
+                                        </p:attrNameLst>
+                                      </p:cBhvr>
+                                      <p:to>
+                                        <p:strVal val="visible"/>
+                                      </p:to>
+                                    </p:set>
+                                  </p:childTnLst>
+                                </p:cTn>
+                              </p:par>
+                            </p:childTnLst>
+                          </p:cTn>
+                        </p:par>
+                      </p:childTnLst>
+                    </p:cTn>
+                  </p:par>
+                </p:childTnLst>
+              </p:cTn>
+              <p:prevCondLst>
+                <p:cond evt="onPrev" delay="0">
+                  <p:tgtEl>
+                    <p:sldTgt/>
+                  </p:tgtEl>
+                </p:cond>
+              </p:prevCondLst>
+              <p:nextCondLst>
+                <p:cond evt="onNext" delay="0">
+                  <p:tgtEl>
+                    <p:sldTgt/>
+                  </p:tgtEl>
+                </p:cond>
+              </p:nextCondLst>
+            </p:seq>
+          </p:childTnLst>
+        </p:cTn>
+      </p:par>
+    </p:tnLst>
+  </p:timing>
+</p:sld>
+</file>
+
+<file path=ppt/slides/slide28.xml><?xml version="1.0" encoding="utf-8"?>
+<p:sld xmlns:a="http://schemas.openxmlformats.org/drawingml/2006/main" xmlns:r="http://schemas.openxmlformats.org/officeDocument/2006/relationships" xmlns:p="http://schemas.openxmlformats.org/presentationml/2006/main">
+  <p:cSld>
+    <p:spTree>
+      <p:nvGrpSpPr>
+        <p:cNvPr id="1" name=""/>
+        <p:cNvGrpSpPr/>
+        <p:nvPr/>
+      </p:nvGrpSpPr>
+      <p:grpSpPr>
+        <a:xfrm>
+          <a:off x="0" y="0"/>
+          <a:ext cx="0" cy="0"/>
+          <a:chOff x="0" y="0"/>
+          <a:chExt cx="0" cy="0"/>
+        </a:xfrm>
+      </p:grpSpPr>
+      <p:sp>
+        <p:nvSpPr>
           <p:cNvPr id="2" name="Title 1">
             <a:extLst>
               <a:ext uri="{FF2B5EF4-FFF2-40B4-BE49-F238E27FC236}">
@@ -21055,7 +22083,7 @@
 </p:sld>
 </file>
 
-<file path=ppt/slides/slide28.xml><?xml version="1.0" encoding="utf-8"?>
+<file path=ppt/slides/slide29.xml><?xml version="1.0" encoding="utf-8"?>
 <p:sld xmlns:a="http://schemas.openxmlformats.org/drawingml/2006/main" xmlns:r="http://schemas.openxmlformats.org/officeDocument/2006/relationships" xmlns:p="http://schemas.openxmlformats.org/presentationml/2006/main">
   <p:cSld>
     <p:spTree>
@@ -21110,8 +22138,8 @@
           </a:p>
         </p:txBody>
       </p:sp>
-      <mc:AlternateContent xmlns:mc="http://schemas.openxmlformats.org/markup-compatibility/2006">
-        <mc:Choice xmlns:a14="http://schemas.microsoft.com/office/drawing/2010/main" Requires="a14">
+      <mc:AlternateContent xmlns:mc="http://schemas.openxmlformats.org/markup-compatibility/2006" xmlns:a14="http://schemas.microsoft.com/office/drawing/2010/main">
+        <mc:Choice Requires="a14">
           <p:sp>
             <p:nvSpPr>
               <p:cNvPr id="3" name="Content Placeholder 2">
@@ -21782,7 +22810,7 @@
             </p:txBody>
           </p:sp>
         </mc:Choice>
-        <mc:Fallback>
+        <mc:Fallback xmlns="">
           <p:sp>
             <p:nvSpPr>
               <p:cNvPr id="3" name="Content Placeholder 2">
@@ -21830,176 +22858,6 @@
     <p:extLst>
       <p:ext uri="{BB962C8B-B14F-4D97-AF65-F5344CB8AC3E}">
         <p14:creationId xmlns:p14="http://schemas.microsoft.com/office/powerpoint/2010/main" val="607904465"/>
-      </p:ext>
-    </p:extLst>
-  </p:cSld>
-  <p:clrMapOvr>
-    <a:masterClrMapping/>
-  </p:clrMapOvr>
-</p:sld>
-</file>
-
-<file path=ppt/slides/slide29.xml><?xml version="1.0" encoding="utf-8"?>
-<p:sld xmlns:a="http://schemas.openxmlformats.org/drawingml/2006/main" xmlns:r="http://schemas.openxmlformats.org/officeDocument/2006/relationships" xmlns:p="http://schemas.openxmlformats.org/presentationml/2006/main">
-  <p:cSld>
-    <p:spTree>
-      <p:nvGrpSpPr>
-        <p:cNvPr id="1" name=""/>
-        <p:cNvGrpSpPr/>
-        <p:nvPr/>
-      </p:nvGrpSpPr>
-      <p:grpSpPr>
-        <a:xfrm>
-          <a:off x="0" y="0"/>
-          <a:ext cx="0" cy="0"/>
-          <a:chOff x="0" y="0"/>
-          <a:chExt cx="0" cy="0"/>
-        </a:xfrm>
-      </p:grpSpPr>
-      <p:sp>
-        <p:nvSpPr>
-          <p:cNvPr id="2" name="Title 1">
-            <a:extLst>
-              <a:ext uri="{FF2B5EF4-FFF2-40B4-BE49-F238E27FC236}">
-                <a16:creationId xmlns:a16="http://schemas.microsoft.com/office/drawing/2014/main" id="{2E28F462-DC1F-48AF-8BA3-5D8B887182ED}"/>
-              </a:ext>
-            </a:extLst>
-          </p:cNvPr>
-          <p:cNvSpPr>
-            <a:spLocks noGrp="1"/>
-          </p:cNvSpPr>
-          <p:nvPr>
-            <p:ph type="title"/>
-          </p:nvPr>
-        </p:nvSpPr>
-        <p:spPr>
-          <a:xfrm>
-            <a:off x="838200" y="365125"/>
-            <a:ext cx="10515600" cy="666233"/>
-          </a:xfrm>
-        </p:spPr>
-        <p:txBody>
-          <a:bodyPr>
-            <a:normAutofit/>
-          </a:bodyPr>
-          <a:lstStyle/>
-          <a:p>
-            <a:r>
-              <a:rPr lang="en-US" sz="4000" dirty="0">
-                <a:latin typeface="+mn-lt"/>
-                <a:cs typeface="Segoe UI" panose="020B0502040204020203" pitchFamily="34" charset="0"/>
-              </a:rPr>
-              <a:t>Singular Value Decomposition </a:t>
-            </a:r>
-          </a:p>
-        </p:txBody>
-      </p:sp>
-      <p:sp>
-        <p:nvSpPr>
-          <p:cNvPr id="3" name="Content Placeholder 2">
-            <a:extLst>
-              <a:ext uri="{FF2B5EF4-FFF2-40B4-BE49-F238E27FC236}">
-                <a16:creationId xmlns:a16="http://schemas.microsoft.com/office/drawing/2014/main" id="{6948E274-B4C9-49D5-BB15-6A382137E2DD}"/>
-              </a:ext>
-            </a:extLst>
-          </p:cNvPr>
-          <p:cNvSpPr>
-            <a:spLocks noGrp="1"/>
-          </p:cNvSpPr>
-          <p:nvPr>
-            <p:ph sz="quarter" idx="10"/>
-          </p:nvPr>
-        </p:nvSpPr>
-        <p:spPr>
-          <a:xfrm>
-            <a:off x="379514" y="1265273"/>
-            <a:ext cx="11525250" cy="5410511"/>
-          </a:xfrm>
-        </p:spPr>
-        <p:txBody>
-          <a:bodyPr/>
-          <a:lstStyle/>
-          <a:p>
-            <a:pPr marL="0" indent="0">
-              <a:buNone/>
-            </a:pPr>
-            <a:r>
-              <a:rPr lang="en-US" dirty="0">
-                <a:cs typeface="Segoe UI" panose="020B0502040204020203" pitchFamily="34" charset="0"/>
-              </a:rPr>
-              <a:t>Singular value decomposition (SVD) is a computational efficient matrix decomposition  </a:t>
-            </a:r>
-            <a:endParaRPr lang="en-US" sz="2800" b="1" dirty="0">
-              <a:latin typeface="+mn-lt"/>
-              <a:cs typeface="Segoe UI" panose="020B0502040204020203" pitchFamily="34" charset="0"/>
-            </a:endParaRPr>
-          </a:p>
-          <a:p>
-            <a:r>
-              <a:rPr lang="en-US" dirty="0">
-                <a:cs typeface="Segoe UI" panose="020B0502040204020203" pitchFamily="34" charset="0"/>
-              </a:rPr>
-              <a:t>At scale, can directly apply SVD to massive feature matrices   </a:t>
-            </a:r>
-          </a:p>
-          <a:p>
-            <a:r>
-              <a:rPr lang="en-US" sz="2800" dirty="0">
-                <a:latin typeface="+mn-lt"/>
-                <a:cs typeface="Segoe UI" panose="020B0502040204020203" pitchFamily="34" charset="0"/>
-              </a:rPr>
-              <a:t>But SVD is not good for sparse matrices, particularly with many 0s   </a:t>
-            </a:r>
-          </a:p>
-          <a:p>
-            <a:r>
-              <a:rPr lang="en-US" dirty="0">
-                <a:cs typeface="Segoe UI" panose="020B0502040204020203" pitchFamily="34" charset="0"/>
-              </a:rPr>
-              <a:t>But, </a:t>
-            </a:r>
-            <a:r>
-              <a:rPr lang="en-US" b="1" dirty="0">
-                <a:cs typeface="Segoe UI" panose="020B0502040204020203" pitchFamily="34" charset="0"/>
-              </a:rPr>
-              <a:t>we do not need the full decomposition! </a:t>
-            </a:r>
-            <a:r>
-              <a:rPr lang="en-US" sz="2800" b="1" dirty="0">
-                <a:cs typeface="Segoe UI" panose="020B0502040204020203" pitchFamily="34" charset="0"/>
-              </a:rPr>
-              <a:t> </a:t>
-            </a:r>
-          </a:p>
-          <a:p>
-            <a:r>
-              <a:rPr lang="en-US" dirty="0">
-                <a:cs typeface="Segoe UI" panose="020B0502040204020203" pitchFamily="34" charset="0"/>
-              </a:rPr>
-              <a:t>Decompose into </a:t>
-            </a:r>
-            <a:r>
-              <a:rPr lang="en-US" b="1" dirty="0">
-                <a:cs typeface="Segoe UI" panose="020B0502040204020203" pitchFamily="34" charset="0"/>
-              </a:rPr>
-              <a:t>low-dimensional embedding factors </a:t>
-            </a:r>
-            <a:endParaRPr lang="en-US" sz="2800" b="1" dirty="0">
-              <a:cs typeface="Segoe UI" panose="020B0502040204020203" pitchFamily="34" charset="0"/>
-            </a:endParaRPr>
-          </a:p>
-          <a:p>
-            <a:endParaRPr lang="en-US" sz="2800" dirty="0">
-              <a:latin typeface="+mn-lt"/>
-              <a:cs typeface="Segoe UI" panose="020B0502040204020203" pitchFamily="34" charset="0"/>
-            </a:endParaRPr>
-          </a:p>
-        </p:txBody>
-      </p:sp>
-    </p:spTree>
-    <p:extLst>
-      <p:ext uri="{BB962C8B-B14F-4D97-AF65-F5344CB8AC3E}">
-        <p14:creationId xmlns:p14="http://schemas.microsoft.com/office/powerpoint/2010/main" val="3881448156"/>
       </p:ext>
     </p:extLst>
   </p:cSld>
@@ -22599,6 +23457,176 @@
 </file>
 
 <file path=ppt/slides/slide30.xml><?xml version="1.0" encoding="utf-8"?>
+<p:sld xmlns:a="http://schemas.openxmlformats.org/drawingml/2006/main" xmlns:r="http://schemas.openxmlformats.org/officeDocument/2006/relationships" xmlns:p="http://schemas.openxmlformats.org/presentationml/2006/main">
+  <p:cSld>
+    <p:spTree>
+      <p:nvGrpSpPr>
+        <p:cNvPr id="1" name=""/>
+        <p:cNvGrpSpPr/>
+        <p:nvPr/>
+      </p:nvGrpSpPr>
+      <p:grpSpPr>
+        <a:xfrm>
+          <a:off x="0" y="0"/>
+          <a:ext cx="0" cy="0"/>
+          <a:chOff x="0" y="0"/>
+          <a:chExt cx="0" cy="0"/>
+        </a:xfrm>
+      </p:grpSpPr>
+      <p:sp>
+        <p:nvSpPr>
+          <p:cNvPr id="2" name="Title 1">
+            <a:extLst>
+              <a:ext uri="{FF2B5EF4-FFF2-40B4-BE49-F238E27FC236}">
+                <a16:creationId xmlns:a16="http://schemas.microsoft.com/office/drawing/2014/main" id="{2E28F462-DC1F-48AF-8BA3-5D8B887182ED}"/>
+              </a:ext>
+            </a:extLst>
+          </p:cNvPr>
+          <p:cNvSpPr>
+            <a:spLocks noGrp="1"/>
+          </p:cNvSpPr>
+          <p:nvPr>
+            <p:ph type="title"/>
+          </p:nvPr>
+        </p:nvSpPr>
+        <p:spPr>
+          <a:xfrm>
+            <a:off x="838200" y="365125"/>
+            <a:ext cx="10515600" cy="666233"/>
+          </a:xfrm>
+        </p:spPr>
+        <p:txBody>
+          <a:bodyPr>
+            <a:normAutofit/>
+          </a:bodyPr>
+          <a:lstStyle/>
+          <a:p>
+            <a:r>
+              <a:rPr lang="en-US" sz="4000" dirty="0">
+                <a:latin typeface="+mn-lt"/>
+                <a:cs typeface="Segoe UI" panose="020B0502040204020203" pitchFamily="34" charset="0"/>
+              </a:rPr>
+              <a:t>Singular Value Decomposition </a:t>
+            </a:r>
+          </a:p>
+        </p:txBody>
+      </p:sp>
+      <p:sp>
+        <p:nvSpPr>
+          <p:cNvPr id="3" name="Content Placeholder 2">
+            <a:extLst>
+              <a:ext uri="{FF2B5EF4-FFF2-40B4-BE49-F238E27FC236}">
+                <a16:creationId xmlns:a16="http://schemas.microsoft.com/office/drawing/2014/main" id="{6948E274-B4C9-49D5-BB15-6A382137E2DD}"/>
+              </a:ext>
+            </a:extLst>
+          </p:cNvPr>
+          <p:cNvSpPr>
+            <a:spLocks noGrp="1"/>
+          </p:cNvSpPr>
+          <p:nvPr>
+            <p:ph sz="quarter" idx="10"/>
+          </p:nvPr>
+        </p:nvSpPr>
+        <p:spPr>
+          <a:xfrm>
+            <a:off x="379514" y="1265273"/>
+            <a:ext cx="11525250" cy="5410511"/>
+          </a:xfrm>
+        </p:spPr>
+        <p:txBody>
+          <a:bodyPr/>
+          <a:lstStyle/>
+          <a:p>
+            <a:pPr marL="0" indent="0">
+              <a:buNone/>
+            </a:pPr>
+            <a:r>
+              <a:rPr lang="en-US" dirty="0">
+                <a:cs typeface="Segoe UI" panose="020B0502040204020203" pitchFamily="34" charset="0"/>
+              </a:rPr>
+              <a:t>Singular value decomposition (SVD) is a computational efficient matrix decomposition  </a:t>
+            </a:r>
+            <a:endParaRPr lang="en-US" sz="2800" b="1" dirty="0">
+              <a:latin typeface="+mn-lt"/>
+              <a:cs typeface="Segoe UI" panose="020B0502040204020203" pitchFamily="34" charset="0"/>
+            </a:endParaRPr>
+          </a:p>
+          <a:p>
+            <a:r>
+              <a:rPr lang="en-US" dirty="0">
+                <a:cs typeface="Segoe UI" panose="020B0502040204020203" pitchFamily="34" charset="0"/>
+              </a:rPr>
+              <a:t>At scale, can directly apply SVD to massive feature matrices   </a:t>
+            </a:r>
+          </a:p>
+          <a:p>
+            <a:r>
+              <a:rPr lang="en-US" sz="2800" dirty="0">
+                <a:latin typeface="+mn-lt"/>
+                <a:cs typeface="Segoe UI" panose="020B0502040204020203" pitchFamily="34" charset="0"/>
+              </a:rPr>
+              <a:t>But SVD is not good for sparse matrices, particularly with many 0s   </a:t>
+            </a:r>
+          </a:p>
+          <a:p>
+            <a:r>
+              <a:rPr lang="en-US" dirty="0">
+                <a:cs typeface="Segoe UI" panose="020B0502040204020203" pitchFamily="34" charset="0"/>
+              </a:rPr>
+              <a:t>But, </a:t>
+            </a:r>
+            <a:r>
+              <a:rPr lang="en-US" b="1" dirty="0">
+                <a:cs typeface="Segoe UI" panose="020B0502040204020203" pitchFamily="34" charset="0"/>
+              </a:rPr>
+              <a:t>we do not need the full decomposition! </a:t>
+            </a:r>
+            <a:r>
+              <a:rPr lang="en-US" sz="2800" b="1" dirty="0">
+                <a:cs typeface="Segoe UI" panose="020B0502040204020203" pitchFamily="34" charset="0"/>
+              </a:rPr>
+              <a:t> </a:t>
+            </a:r>
+          </a:p>
+          <a:p>
+            <a:r>
+              <a:rPr lang="en-US" dirty="0">
+                <a:cs typeface="Segoe UI" panose="020B0502040204020203" pitchFamily="34" charset="0"/>
+              </a:rPr>
+              <a:t>Decompose into </a:t>
+            </a:r>
+            <a:r>
+              <a:rPr lang="en-US" b="1" dirty="0">
+                <a:cs typeface="Segoe UI" panose="020B0502040204020203" pitchFamily="34" charset="0"/>
+              </a:rPr>
+              <a:t>low-dimensional embedding factors </a:t>
+            </a:r>
+            <a:endParaRPr lang="en-US" sz="2800" b="1" dirty="0">
+              <a:cs typeface="Segoe UI" panose="020B0502040204020203" pitchFamily="34" charset="0"/>
+            </a:endParaRPr>
+          </a:p>
+          <a:p>
+            <a:endParaRPr lang="en-US" sz="2800" dirty="0">
+              <a:latin typeface="+mn-lt"/>
+              <a:cs typeface="Segoe UI" panose="020B0502040204020203" pitchFamily="34" charset="0"/>
+            </a:endParaRPr>
+          </a:p>
+        </p:txBody>
+      </p:sp>
+    </p:spTree>
+    <p:extLst>
+      <p:ext uri="{BB962C8B-B14F-4D97-AF65-F5344CB8AC3E}">
+        <p14:creationId xmlns:p14="http://schemas.microsoft.com/office/powerpoint/2010/main" val="3881448156"/>
+      </p:ext>
+    </p:extLst>
+  </p:cSld>
+  <p:clrMapOvr>
+    <a:masterClrMapping/>
+  </p:clrMapOvr>
+</p:sld>
+</file>
+
+<file path=ppt/slides/slide31.xml><?xml version="1.0" encoding="utf-8"?>
 <p:sld xmlns:a="http://schemas.openxmlformats.org/drawingml/2006/main" xmlns:r="http://schemas.openxmlformats.org/officeDocument/2006/relationships" xmlns:p="http://schemas.openxmlformats.org/presentationml/2006/main">
   <p:cSld>
     <p:spTree>
@@ -24675,7 +25703,7 @@
 </p:sld>
 </file>
 
-<file path=ppt/slides/slide31.xml><?xml version="1.0" encoding="utf-8"?>
+<file path=ppt/slides/slide32.xml><?xml version="1.0" encoding="utf-8"?>
 <p:sld xmlns:a="http://schemas.openxmlformats.org/drawingml/2006/main" xmlns:r="http://schemas.openxmlformats.org/officeDocument/2006/relationships" xmlns:p="http://schemas.openxmlformats.org/presentationml/2006/main">
   <p:cSld>
     <p:spTree>
@@ -25970,7 +26998,7 @@
 </p:sld>
 </file>
 
-<file path=ppt/slides/slide32.xml><?xml version="1.0" encoding="utf-8"?>
+<file path=ppt/slides/slide33.xml><?xml version="1.0" encoding="utf-8"?>
 <p:sld xmlns:a="http://schemas.openxmlformats.org/drawingml/2006/main" xmlns:r="http://schemas.openxmlformats.org/officeDocument/2006/relationships" xmlns:p="http://schemas.openxmlformats.org/presentationml/2006/main">
   <p:cSld>
     <p:spTree>
@@ -26025,8 +27053,8 @@
           </a:p>
         </p:txBody>
       </p:sp>
-      <mc:AlternateContent xmlns:mc="http://schemas.openxmlformats.org/markup-compatibility/2006">
-        <mc:Choice xmlns:a14="http://schemas.microsoft.com/office/drawing/2010/main" Requires="a14">
+      <mc:AlternateContent xmlns:mc="http://schemas.openxmlformats.org/markup-compatibility/2006" xmlns:a14="http://schemas.microsoft.com/office/drawing/2010/main">
+        <mc:Choice Requires="a14">
           <p:sp>
             <p:nvSpPr>
               <p:cNvPr id="3" name="Content Placeholder 2">
@@ -26741,7 +27769,7 @@
             </p:txBody>
           </p:sp>
         </mc:Choice>
-        <mc:Fallback>
+        <mc:Fallback xmlns="">
           <p:sp>
             <p:nvSpPr>
               <p:cNvPr id="3" name="Content Placeholder 2">
@@ -26957,7 +27985,7 @@
 </p:sld>
 </file>
 
-<file path=ppt/slides/slide33.xml><?xml version="1.0" encoding="utf-8"?>
+<file path=ppt/slides/slide34.xml><?xml version="1.0" encoding="utf-8"?>
 <p:sld xmlns:a="http://schemas.openxmlformats.org/drawingml/2006/main" xmlns:r="http://schemas.openxmlformats.org/officeDocument/2006/relationships" xmlns:p="http://schemas.openxmlformats.org/presentationml/2006/main">
   <p:cSld>
     <p:spTree>
@@ -27012,8 +28040,8 @@
           </a:p>
         </p:txBody>
       </p:sp>
-      <mc:AlternateContent xmlns:mc="http://schemas.openxmlformats.org/markup-compatibility/2006">
-        <mc:Choice xmlns:a14="http://schemas.microsoft.com/office/drawing/2010/main" Requires="a14">
+      <mc:AlternateContent xmlns:mc="http://schemas.openxmlformats.org/markup-compatibility/2006" xmlns:a14="http://schemas.microsoft.com/office/drawing/2010/main">
+        <mc:Choice Requires="a14">
           <p:sp>
             <p:nvSpPr>
               <p:cNvPr id="3" name="Content Placeholder 2">
@@ -27582,7 +28610,7 @@
             </p:txBody>
           </p:sp>
         </mc:Choice>
-        <mc:Fallback>
+        <mc:Fallback xmlns="">
           <p:sp>
             <p:nvSpPr>
               <p:cNvPr id="3" name="Content Placeholder 2">
@@ -27767,7 +28795,7 @@
 </p:sld>
 </file>
 
-<file path=ppt/slides/slide34.xml><?xml version="1.0" encoding="utf-8"?>
+<file path=ppt/slides/slide35.xml><?xml version="1.0" encoding="utf-8"?>
 <p:sld xmlns:a="http://schemas.openxmlformats.org/drawingml/2006/main" xmlns:r="http://schemas.openxmlformats.org/officeDocument/2006/relationships" xmlns:p="http://schemas.openxmlformats.org/presentationml/2006/main">
   <p:cSld>
     <p:spTree>
@@ -27829,7 +28857,7 @@
 </p:sld>
 </file>
 
-<file path=ppt/slides/slide35.xml><?xml version="1.0" encoding="utf-8"?>
+<file path=ppt/slides/slide36.xml><?xml version="1.0" encoding="utf-8"?>
 <p:sld xmlns:a="http://schemas.openxmlformats.org/drawingml/2006/main" xmlns:r="http://schemas.openxmlformats.org/officeDocument/2006/relationships" xmlns:p="http://schemas.openxmlformats.org/presentationml/2006/main">
   <p:cSld>
     <p:spTree>
@@ -28215,7 +29243,7 @@
 </p:sld>
 </file>
 
-<file path=ppt/slides/slide36.xml><?xml version="1.0" encoding="utf-8"?>
+<file path=ppt/slides/slide37.xml><?xml version="1.0" encoding="utf-8"?>
 <p:sld xmlns:a="http://schemas.openxmlformats.org/drawingml/2006/main" xmlns:r="http://schemas.openxmlformats.org/officeDocument/2006/relationships" xmlns:p="http://schemas.openxmlformats.org/presentationml/2006/main">
   <p:cSld>
     <p:spTree>
@@ -30652,7 +31680,7 @@
 </p:sld>
 </file>
 
-<file path=ppt/slides/slide37.xml><?xml version="1.0" encoding="utf-8"?>
+<file path=ppt/slides/slide38.xml><?xml version="1.0" encoding="utf-8"?>
 <p:sld xmlns:a="http://schemas.openxmlformats.org/drawingml/2006/main" xmlns:r="http://schemas.openxmlformats.org/officeDocument/2006/relationships" xmlns:p="http://schemas.openxmlformats.org/presentationml/2006/main">
   <p:cSld>
     <p:spTree>
@@ -35434,7 +36462,7 @@
 </p:sld>
 </file>
 
-<file path=ppt/slides/slide38.xml><?xml version="1.0" encoding="utf-8"?>
+<file path=ppt/slides/slide39.xml><?xml version="1.0" encoding="utf-8"?>
 <p:sld xmlns:a="http://schemas.openxmlformats.org/drawingml/2006/main" xmlns:r="http://schemas.openxmlformats.org/officeDocument/2006/relationships" xmlns:p="http://schemas.openxmlformats.org/presentationml/2006/main">
   <p:cSld>
     <p:spTree>
@@ -36084,7 +37112,7 @@
 </p:sld>
 </file>
 
-<file path=ppt/slides/slide39.xml><?xml version="1.0" encoding="utf-8"?>
+<file path=ppt/slides/slide4.xml><?xml version="1.0" encoding="utf-8"?>
 <p:sld xmlns:a="http://schemas.openxmlformats.org/drawingml/2006/main" xmlns:r="http://schemas.openxmlformats.org/officeDocument/2006/relationships" xmlns:p="http://schemas.openxmlformats.org/presentationml/2006/main">
   <p:cSld>
     <p:spTree>
@@ -36125,13 +37153,601 @@
           <a:p>
             <a:r>
               <a:rPr lang="en-US" dirty="0"/>
+              <a:t>Introduction to Dimensionality Reduction</a:t>
+            </a:r>
+          </a:p>
+        </p:txBody>
+      </p:sp>
+      <p:sp>
+        <p:nvSpPr>
+          <p:cNvPr id="3" name="Content Placeholder 2"/>
+          <p:cNvSpPr>
+            <a:spLocks noGrp="1"/>
+          </p:cNvSpPr>
+          <p:nvPr>
+            <p:ph sz="quarter" idx="10"/>
+          </p:nvPr>
+        </p:nvSpPr>
+        <p:spPr>
+          <a:xfrm>
+            <a:off x="333375" y="1004777"/>
+            <a:ext cx="11525250" cy="5181690"/>
+          </a:xfrm>
+        </p:spPr>
+        <p:txBody>
+          <a:bodyPr>
+            <a:normAutofit/>
+          </a:bodyPr>
+          <a:lstStyle/>
+          <a:p>
+            <a:pPr marL="0" indent="0">
+              <a:buNone/>
+            </a:pPr>
+            <a:r>
+              <a:rPr lang="en-US" dirty="0">
+                <a:latin typeface="+mn-lt"/>
+              </a:rPr>
+              <a:t>Why is dimensionality reduction possible? </a:t>
+            </a:r>
+          </a:p>
+          <a:p>
+            <a:r>
+              <a:rPr lang="en-US" dirty="0">
+                <a:latin typeface="+mn-lt"/>
+              </a:rPr>
+              <a:t>Consider the information content of each feature</a:t>
+            </a:r>
+          </a:p>
+          <a:p>
+            <a:pPr lvl="1"/>
+            <a:r>
+              <a:rPr lang="en-US" dirty="0">
+                <a:latin typeface="+mn-lt"/>
+              </a:rPr>
+              <a:t>Information of a feature is only unique if it is independent of all other features </a:t>
+            </a:r>
+          </a:p>
+          <a:p>
+            <a:pPr lvl="1"/>
+            <a:r>
+              <a:rPr lang="en-US" dirty="0">
+                <a:latin typeface="+mn-lt"/>
+              </a:rPr>
+              <a:t>Dependent features have redundant information </a:t>
+            </a:r>
+          </a:p>
+          <a:p>
+            <a:r>
+              <a:rPr lang="en-US" dirty="0">
+                <a:latin typeface="+mn-lt"/>
+              </a:rPr>
+              <a:t>Dimensionality can be reduced if features are dependent </a:t>
+            </a:r>
+          </a:p>
+          <a:p>
+            <a:pPr lvl="1"/>
+            <a:r>
+              <a:rPr lang="en-US" dirty="0">
+                <a:latin typeface="+mn-lt"/>
+              </a:rPr>
+              <a:t>Almost always the case in real-world data </a:t>
+            </a:r>
+          </a:p>
+          <a:p>
+            <a:pPr lvl="1"/>
+            <a:r>
+              <a:rPr lang="en-US" dirty="0">
+                <a:latin typeface="+mn-lt"/>
+              </a:rPr>
+              <a:t>Linear dependency </a:t>
+            </a:r>
+          </a:p>
+          <a:p>
+            <a:pPr lvl="1"/>
+            <a:r>
+              <a:rPr lang="en-US" dirty="0">
+                <a:latin typeface="+mn-lt"/>
+              </a:rPr>
+              <a:t>Nonlinear dependency </a:t>
+            </a:r>
+          </a:p>
+          <a:p>
+            <a:r>
+              <a:rPr lang="en-US" dirty="0">
+                <a:latin typeface="+mn-lt"/>
+              </a:rPr>
+              <a:t>Dependency implies effective dimensionality less than number of features</a:t>
+            </a:r>
+          </a:p>
+          <a:p>
+            <a:pPr lvl="1"/>
+            <a:endParaRPr lang="en-US" dirty="0"/>
+          </a:p>
+        </p:txBody>
+      </p:sp>
+    </p:spTree>
+    <p:extLst>
+      <p:ext uri="{BB962C8B-B14F-4D97-AF65-F5344CB8AC3E}">
+        <p14:creationId xmlns:p14="http://schemas.microsoft.com/office/powerpoint/2010/main" val="1424018027"/>
+      </p:ext>
+    </p:extLst>
+  </p:cSld>
+  <p:clrMapOvr>
+    <a:masterClrMapping/>
+  </p:clrMapOvr>
+  <p:timing>
+    <p:tnLst>
+      <p:par>
+        <p:cTn id="1" dur="indefinite" restart="never" nodeType="tmRoot">
+          <p:childTnLst>
+            <p:seq concurrent="1" nextAc="seek">
+              <p:cTn id="2" dur="indefinite" nodeType="mainSeq">
+                <p:childTnLst>
+                  <p:par>
+                    <p:cTn id="3" fill="hold">
+                      <p:stCondLst>
+                        <p:cond delay="indefinite"/>
+                      </p:stCondLst>
+                      <p:childTnLst>
+                        <p:par>
+                          <p:cTn id="4" fill="hold">
+                            <p:stCondLst>
+                              <p:cond delay="0"/>
+                            </p:stCondLst>
+                            <p:childTnLst>
+                              <p:par>
+                                <p:cTn id="5" presetID="1" presetClass="entr" presetSubtype="0" fill="hold" nodeType="clickEffect">
+                                  <p:stCondLst>
+                                    <p:cond delay="0"/>
+                                  </p:stCondLst>
+                                  <p:childTnLst>
+                                    <p:set>
+                                      <p:cBhvr>
+                                        <p:cTn id="6" dur="1" fill="hold">
+                                          <p:stCondLst>
+                                            <p:cond delay="0"/>
+                                          </p:stCondLst>
+                                        </p:cTn>
+                                        <p:tgtEl>
+                                          <p:spTgt spid="3">
+                                            <p:txEl>
+                                              <p:pRg st="1" end="1"/>
+                                            </p:txEl>
+                                          </p:spTgt>
+                                        </p:tgtEl>
+                                        <p:attrNameLst>
+                                          <p:attrName>style.visibility</p:attrName>
+                                        </p:attrNameLst>
+                                      </p:cBhvr>
+                                      <p:to>
+                                        <p:strVal val="visible"/>
+                                      </p:to>
+                                    </p:set>
+                                  </p:childTnLst>
+                                </p:cTn>
+                              </p:par>
+                            </p:childTnLst>
+                          </p:cTn>
+                        </p:par>
+                      </p:childTnLst>
+                    </p:cTn>
+                  </p:par>
+                  <p:par>
+                    <p:cTn id="7" fill="hold">
+                      <p:stCondLst>
+                        <p:cond delay="indefinite"/>
+                      </p:stCondLst>
+                      <p:childTnLst>
+                        <p:par>
+                          <p:cTn id="8" fill="hold">
+                            <p:stCondLst>
+                              <p:cond delay="0"/>
+                            </p:stCondLst>
+                            <p:childTnLst>
+                              <p:par>
+                                <p:cTn id="9" presetID="1" presetClass="entr" presetSubtype="0" fill="hold" nodeType="clickEffect">
+                                  <p:stCondLst>
+                                    <p:cond delay="0"/>
+                                  </p:stCondLst>
+                                  <p:childTnLst>
+                                    <p:set>
+                                      <p:cBhvr>
+                                        <p:cTn id="10" dur="1" fill="hold">
+                                          <p:stCondLst>
+                                            <p:cond delay="0"/>
+                                          </p:stCondLst>
+                                        </p:cTn>
+                                        <p:tgtEl>
+                                          <p:spTgt spid="3">
+                                            <p:txEl>
+                                              <p:pRg st="2" end="2"/>
+                                            </p:txEl>
+                                          </p:spTgt>
+                                        </p:tgtEl>
+                                        <p:attrNameLst>
+                                          <p:attrName>style.visibility</p:attrName>
+                                        </p:attrNameLst>
+                                      </p:cBhvr>
+                                      <p:to>
+                                        <p:strVal val="visible"/>
+                                      </p:to>
+                                    </p:set>
+                                  </p:childTnLst>
+                                </p:cTn>
+                              </p:par>
+                            </p:childTnLst>
+                          </p:cTn>
+                        </p:par>
+                      </p:childTnLst>
+                    </p:cTn>
+                  </p:par>
+                  <p:par>
+                    <p:cTn id="11" fill="hold">
+                      <p:stCondLst>
+                        <p:cond delay="indefinite"/>
+                      </p:stCondLst>
+                      <p:childTnLst>
+                        <p:par>
+                          <p:cTn id="12" fill="hold">
+                            <p:stCondLst>
+                              <p:cond delay="0"/>
+                            </p:stCondLst>
+                            <p:childTnLst>
+                              <p:par>
+                                <p:cTn id="13" presetID="1" presetClass="entr" presetSubtype="0" fill="hold" nodeType="clickEffect">
+                                  <p:stCondLst>
+                                    <p:cond delay="0"/>
+                                  </p:stCondLst>
+                                  <p:childTnLst>
+                                    <p:set>
+                                      <p:cBhvr>
+                                        <p:cTn id="14" dur="1" fill="hold">
+                                          <p:stCondLst>
+                                            <p:cond delay="0"/>
+                                          </p:stCondLst>
+                                        </p:cTn>
+                                        <p:tgtEl>
+                                          <p:spTgt spid="3">
+                                            <p:txEl>
+                                              <p:pRg st="3" end="3"/>
+                                            </p:txEl>
+                                          </p:spTgt>
+                                        </p:tgtEl>
+                                        <p:attrNameLst>
+                                          <p:attrName>style.visibility</p:attrName>
+                                        </p:attrNameLst>
+                                      </p:cBhvr>
+                                      <p:to>
+                                        <p:strVal val="visible"/>
+                                      </p:to>
+                                    </p:set>
+                                  </p:childTnLst>
+                                </p:cTn>
+                              </p:par>
+                            </p:childTnLst>
+                          </p:cTn>
+                        </p:par>
+                      </p:childTnLst>
+                    </p:cTn>
+                  </p:par>
+                  <p:par>
+                    <p:cTn id="15" fill="hold">
+                      <p:stCondLst>
+                        <p:cond delay="indefinite"/>
+                      </p:stCondLst>
+                      <p:childTnLst>
+                        <p:par>
+                          <p:cTn id="16" fill="hold">
+                            <p:stCondLst>
+                              <p:cond delay="0"/>
+                            </p:stCondLst>
+                            <p:childTnLst>
+                              <p:par>
+                                <p:cTn id="17" presetID="1" presetClass="entr" presetSubtype="0" fill="hold" nodeType="clickEffect">
+                                  <p:stCondLst>
+                                    <p:cond delay="0"/>
+                                  </p:stCondLst>
+                                  <p:childTnLst>
+                                    <p:set>
+                                      <p:cBhvr>
+                                        <p:cTn id="18" dur="1" fill="hold">
+                                          <p:stCondLst>
+                                            <p:cond delay="0"/>
+                                          </p:stCondLst>
+                                        </p:cTn>
+                                        <p:tgtEl>
+                                          <p:spTgt spid="3">
+                                            <p:txEl>
+                                              <p:pRg st="4" end="4"/>
+                                            </p:txEl>
+                                          </p:spTgt>
+                                        </p:tgtEl>
+                                        <p:attrNameLst>
+                                          <p:attrName>style.visibility</p:attrName>
+                                        </p:attrNameLst>
+                                      </p:cBhvr>
+                                      <p:to>
+                                        <p:strVal val="visible"/>
+                                      </p:to>
+                                    </p:set>
+                                  </p:childTnLst>
+                                </p:cTn>
+                              </p:par>
+                            </p:childTnLst>
+                          </p:cTn>
+                        </p:par>
+                      </p:childTnLst>
+                    </p:cTn>
+                  </p:par>
+                  <p:par>
+                    <p:cTn id="19" fill="hold">
+                      <p:stCondLst>
+                        <p:cond delay="indefinite"/>
+                      </p:stCondLst>
+                      <p:childTnLst>
+                        <p:par>
+                          <p:cTn id="20" fill="hold">
+                            <p:stCondLst>
+                              <p:cond delay="0"/>
+                            </p:stCondLst>
+                            <p:childTnLst>
+                              <p:par>
+                                <p:cTn id="21" presetID="1" presetClass="entr" presetSubtype="0" fill="hold" nodeType="clickEffect">
+                                  <p:stCondLst>
+                                    <p:cond delay="0"/>
+                                  </p:stCondLst>
+                                  <p:childTnLst>
+                                    <p:set>
+                                      <p:cBhvr>
+                                        <p:cTn id="22" dur="1" fill="hold">
+                                          <p:stCondLst>
+                                            <p:cond delay="0"/>
+                                          </p:stCondLst>
+                                        </p:cTn>
+                                        <p:tgtEl>
+                                          <p:spTgt spid="3">
+                                            <p:txEl>
+                                              <p:pRg st="5" end="5"/>
+                                            </p:txEl>
+                                          </p:spTgt>
+                                        </p:tgtEl>
+                                        <p:attrNameLst>
+                                          <p:attrName>style.visibility</p:attrName>
+                                        </p:attrNameLst>
+                                      </p:cBhvr>
+                                      <p:to>
+                                        <p:strVal val="visible"/>
+                                      </p:to>
+                                    </p:set>
+                                  </p:childTnLst>
+                                </p:cTn>
+                              </p:par>
+                            </p:childTnLst>
+                          </p:cTn>
+                        </p:par>
+                      </p:childTnLst>
+                    </p:cTn>
+                  </p:par>
+                  <p:par>
+                    <p:cTn id="23" fill="hold">
+                      <p:stCondLst>
+                        <p:cond delay="indefinite"/>
+                      </p:stCondLst>
+                      <p:childTnLst>
+                        <p:par>
+                          <p:cTn id="24" fill="hold">
+                            <p:stCondLst>
+                              <p:cond delay="0"/>
+                            </p:stCondLst>
+                            <p:childTnLst>
+                              <p:par>
+                                <p:cTn id="25" presetID="1" presetClass="entr" presetSubtype="0" fill="hold" nodeType="clickEffect">
+                                  <p:stCondLst>
+                                    <p:cond delay="0"/>
+                                  </p:stCondLst>
+                                  <p:childTnLst>
+                                    <p:set>
+                                      <p:cBhvr>
+                                        <p:cTn id="26" dur="1" fill="hold">
+                                          <p:stCondLst>
+                                            <p:cond delay="0"/>
+                                          </p:stCondLst>
+                                        </p:cTn>
+                                        <p:tgtEl>
+                                          <p:spTgt spid="3">
+                                            <p:txEl>
+                                              <p:pRg st="6" end="6"/>
+                                            </p:txEl>
+                                          </p:spTgt>
+                                        </p:tgtEl>
+                                        <p:attrNameLst>
+                                          <p:attrName>style.visibility</p:attrName>
+                                        </p:attrNameLst>
+                                      </p:cBhvr>
+                                      <p:to>
+                                        <p:strVal val="visible"/>
+                                      </p:to>
+                                    </p:set>
+                                  </p:childTnLst>
+                                </p:cTn>
+                              </p:par>
+                            </p:childTnLst>
+                          </p:cTn>
+                        </p:par>
+                      </p:childTnLst>
+                    </p:cTn>
+                  </p:par>
+                  <p:par>
+                    <p:cTn id="27" fill="hold">
+                      <p:stCondLst>
+                        <p:cond delay="indefinite"/>
+                      </p:stCondLst>
+                      <p:childTnLst>
+                        <p:par>
+                          <p:cTn id="28" fill="hold">
+                            <p:stCondLst>
+                              <p:cond delay="0"/>
+                            </p:stCondLst>
+                            <p:childTnLst>
+                              <p:par>
+                                <p:cTn id="29" presetID="1" presetClass="entr" presetSubtype="0" fill="hold" nodeType="clickEffect">
+                                  <p:stCondLst>
+                                    <p:cond delay="0"/>
+                                  </p:stCondLst>
+                                  <p:childTnLst>
+                                    <p:set>
+                                      <p:cBhvr>
+                                        <p:cTn id="30" dur="1" fill="hold">
+                                          <p:stCondLst>
+                                            <p:cond delay="0"/>
+                                          </p:stCondLst>
+                                        </p:cTn>
+                                        <p:tgtEl>
+                                          <p:spTgt spid="3">
+                                            <p:txEl>
+                                              <p:pRg st="7" end="7"/>
+                                            </p:txEl>
+                                          </p:spTgt>
+                                        </p:tgtEl>
+                                        <p:attrNameLst>
+                                          <p:attrName>style.visibility</p:attrName>
+                                        </p:attrNameLst>
+                                      </p:cBhvr>
+                                      <p:to>
+                                        <p:strVal val="visible"/>
+                                      </p:to>
+                                    </p:set>
+                                  </p:childTnLst>
+                                </p:cTn>
+                              </p:par>
+                            </p:childTnLst>
+                          </p:cTn>
+                        </p:par>
+                      </p:childTnLst>
+                    </p:cTn>
+                  </p:par>
+                  <p:par>
+                    <p:cTn id="31" fill="hold">
+                      <p:stCondLst>
+                        <p:cond delay="indefinite"/>
+                      </p:stCondLst>
+                      <p:childTnLst>
+                        <p:par>
+                          <p:cTn id="32" fill="hold">
+                            <p:stCondLst>
+                              <p:cond delay="0"/>
+                            </p:stCondLst>
+                            <p:childTnLst>
+                              <p:par>
+                                <p:cTn id="33" presetID="1" presetClass="entr" presetSubtype="0" fill="hold" nodeType="clickEffect">
+                                  <p:stCondLst>
+                                    <p:cond delay="0"/>
+                                  </p:stCondLst>
+                                  <p:childTnLst>
+                                    <p:set>
+                                      <p:cBhvr>
+                                        <p:cTn id="34" dur="1" fill="hold">
+                                          <p:stCondLst>
+                                            <p:cond delay="0"/>
+                                          </p:stCondLst>
+                                        </p:cTn>
+                                        <p:tgtEl>
+                                          <p:spTgt spid="3">
+                                            <p:txEl>
+                                              <p:pRg st="8" end="8"/>
+                                            </p:txEl>
+                                          </p:spTgt>
+                                        </p:tgtEl>
+                                        <p:attrNameLst>
+                                          <p:attrName>style.visibility</p:attrName>
+                                        </p:attrNameLst>
+                                      </p:cBhvr>
+                                      <p:to>
+                                        <p:strVal val="visible"/>
+                                      </p:to>
+                                    </p:set>
+                                  </p:childTnLst>
+                                </p:cTn>
+                              </p:par>
+                            </p:childTnLst>
+                          </p:cTn>
+                        </p:par>
+                      </p:childTnLst>
+                    </p:cTn>
+                  </p:par>
+                </p:childTnLst>
+              </p:cTn>
+              <p:prevCondLst>
+                <p:cond evt="onPrev" delay="0">
+                  <p:tgtEl>
+                    <p:sldTgt/>
+                  </p:tgtEl>
+                </p:cond>
+              </p:prevCondLst>
+              <p:nextCondLst>
+                <p:cond evt="onNext" delay="0">
+                  <p:tgtEl>
+                    <p:sldTgt/>
+                  </p:tgtEl>
+                </p:cond>
+              </p:nextCondLst>
+            </p:seq>
+          </p:childTnLst>
+        </p:cTn>
+      </p:par>
+    </p:tnLst>
+  </p:timing>
+</p:sld>
+</file>
+
+<file path=ppt/slides/slide40.xml><?xml version="1.0" encoding="utf-8"?>
+<p:sld xmlns:a="http://schemas.openxmlformats.org/drawingml/2006/main" xmlns:r="http://schemas.openxmlformats.org/officeDocument/2006/relationships" xmlns:p="http://schemas.openxmlformats.org/presentationml/2006/main">
+  <p:cSld>
+    <p:spTree>
+      <p:nvGrpSpPr>
+        <p:cNvPr id="1" name=""/>
+        <p:cNvGrpSpPr/>
+        <p:nvPr/>
+      </p:nvGrpSpPr>
+      <p:grpSpPr>
+        <a:xfrm>
+          <a:off x="0" y="0"/>
+          <a:ext cx="0" cy="0"/>
+          <a:chOff x="0" y="0"/>
+          <a:chExt cx="0" cy="0"/>
+        </a:xfrm>
+      </p:grpSpPr>
+      <p:sp>
+        <p:nvSpPr>
+          <p:cNvPr id="2" name="Title 1"/>
+          <p:cNvSpPr>
+            <a:spLocks noGrp="1"/>
+          </p:cNvSpPr>
+          <p:nvPr>
+            <p:ph type="title"/>
+          </p:nvPr>
+        </p:nvSpPr>
+        <p:spPr>
+          <a:xfrm>
+            <a:off x="584200" y="221992"/>
+            <a:ext cx="10515600" cy="530954"/>
+          </a:xfrm>
+        </p:spPr>
+        <p:txBody>
+          <a:bodyPr>
+            <a:normAutofit fontScale="90000"/>
+          </a:bodyPr>
+          <a:lstStyle/>
+          <a:p>
+            <a:r>
+              <a:rPr lang="en-US" dirty="0"/>
               <a:t>Mapping to Linear Space with a Kernel</a:t>
             </a:r>
           </a:p>
         </p:txBody>
       </p:sp>
-      <mc:AlternateContent xmlns:mc="http://schemas.openxmlformats.org/markup-compatibility/2006">
-        <mc:Choice xmlns:a14="http://schemas.microsoft.com/office/drawing/2010/main" Requires="a14">
+      <mc:AlternateContent xmlns:mc="http://schemas.openxmlformats.org/markup-compatibility/2006" xmlns:a14="http://schemas.microsoft.com/office/drawing/2010/main">
+        <mc:Choice Requires="a14">
           <p:sp>
             <p:nvSpPr>
               <p:cNvPr id="3" name="Content Placeholder 2"/>
@@ -36853,7 +38469,7 @@
             </p:txBody>
           </p:sp>
         </mc:Choice>
-        <mc:Fallback>
+        <mc:Fallback xmlns="">
           <p:sp>
             <p:nvSpPr>
               <p:cNvPr id="3" name="Content Placeholder 2"/>
@@ -36904,7 +38520,7 @@
 </p:sld>
 </file>
 
-<file path=ppt/slides/slide4.xml><?xml version="1.0" encoding="utf-8"?>
+<file path=ppt/slides/slide41.xml><?xml version="1.0" encoding="utf-8"?>
 <p:sld xmlns:a="http://schemas.openxmlformats.org/drawingml/2006/main" xmlns:r="http://schemas.openxmlformats.org/officeDocument/2006/relationships" xmlns:p="http://schemas.openxmlformats.org/presentationml/2006/main">
   <p:cSld>
     <p:spTree>
@@ -36945,601 +38561,13 @@
           <a:p>
             <a:r>
               <a:rPr lang="en-US" dirty="0"/>
-              <a:t>Introduction to Dimensionality Reduction</a:t>
+              <a:t>Kernels nonlinear separation</a:t>
             </a:r>
           </a:p>
         </p:txBody>
       </p:sp>
-      <p:sp>
-        <p:nvSpPr>
-          <p:cNvPr id="3" name="Content Placeholder 2"/>
-          <p:cNvSpPr>
-            <a:spLocks noGrp="1"/>
-          </p:cNvSpPr>
-          <p:nvPr>
-            <p:ph sz="quarter" idx="10"/>
-          </p:nvPr>
-        </p:nvSpPr>
-        <p:spPr>
-          <a:xfrm>
-            <a:off x="333375" y="1004777"/>
-            <a:ext cx="11525250" cy="5181690"/>
-          </a:xfrm>
-        </p:spPr>
-        <p:txBody>
-          <a:bodyPr>
-            <a:normAutofit/>
-          </a:bodyPr>
-          <a:lstStyle/>
-          <a:p>
-            <a:pPr marL="0" indent="0">
-              <a:buNone/>
-            </a:pPr>
-            <a:r>
-              <a:rPr lang="en-US" dirty="0">
-                <a:latin typeface="+mn-lt"/>
-              </a:rPr>
-              <a:t>Why is dimensionality reduction possible? </a:t>
-            </a:r>
-          </a:p>
-          <a:p>
-            <a:r>
-              <a:rPr lang="en-US" dirty="0">
-                <a:latin typeface="+mn-lt"/>
-              </a:rPr>
-              <a:t>Consider the information content of each feature</a:t>
-            </a:r>
-          </a:p>
-          <a:p>
-            <a:pPr lvl="1"/>
-            <a:r>
-              <a:rPr lang="en-US" dirty="0">
-                <a:latin typeface="+mn-lt"/>
-              </a:rPr>
-              <a:t>Information of a feature is only unique if it is independent of all other features </a:t>
-            </a:r>
-          </a:p>
-          <a:p>
-            <a:pPr lvl="1"/>
-            <a:r>
-              <a:rPr lang="en-US" dirty="0">
-                <a:latin typeface="+mn-lt"/>
-              </a:rPr>
-              <a:t>Dependent features have redundant information </a:t>
-            </a:r>
-          </a:p>
-          <a:p>
-            <a:r>
-              <a:rPr lang="en-US" dirty="0">
-                <a:latin typeface="+mn-lt"/>
-              </a:rPr>
-              <a:t>Dimensionality can be reduced if features are dependent </a:t>
-            </a:r>
-          </a:p>
-          <a:p>
-            <a:pPr lvl="1"/>
-            <a:r>
-              <a:rPr lang="en-US" dirty="0">
-                <a:latin typeface="+mn-lt"/>
-              </a:rPr>
-              <a:t>Almost always the case in real-world data </a:t>
-            </a:r>
-          </a:p>
-          <a:p>
-            <a:pPr lvl="1"/>
-            <a:r>
-              <a:rPr lang="en-US" dirty="0">
-                <a:latin typeface="+mn-lt"/>
-              </a:rPr>
-              <a:t>Linear dependency </a:t>
-            </a:r>
-          </a:p>
-          <a:p>
-            <a:pPr lvl="1"/>
-            <a:r>
-              <a:rPr lang="en-US" dirty="0">
-                <a:latin typeface="+mn-lt"/>
-              </a:rPr>
-              <a:t>Nonlinear dependency </a:t>
-            </a:r>
-          </a:p>
-          <a:p>
-            <a:r>
-              <a:rPr lang="en-US" dirty="0">
-                <a:latin typeface="+mn-lt"/>
-              </a:rPr>
-              <a:t>Dependency implies effective dimensionality less than number of features</a:t>
-            </a:r>
-          </a:p>
-          <a:p>
-            <a:pPr lvl="1"/>
-            <a:endParaRPr lang="en-US" dirty="0"/>
-          </a:p>
-        </p:txBody>
-      </p:sp>
-    </p:spTree>
-    <p:extLst>
-      <p:ext uri="{BB962C8B-B14F-4D97-AF65-F5344CB8AC3E}">
-        <p14:creationId xmlns:p14="http://schemas.microsoft.com/office/powerpoint/2010/main" val="1424018027"/>
-      </p:ext>
-    </p:extLst>
-  </p:cSld>
-  <p:clrMapOvr>
-    <a:masterClrMapping/>
-  </p:clrMapOvr>
-  <p:timing>
-    <p:tnLst>
-      <p:par>
-        <p:cTn id="1" dur="indefinite" restart="never" nodeType="tmRoot">
-          <p:childTnLst>
-            <p:seq concurrent="1" nextAc="seek">
-              <p:cTn id="2" dur="indefinite" nodeType="mainSeq">
-                <p:childTnLst>
-                  <p:par>
-                    <p:cTn id="3" fill="hold">
-                      <p:stCondLst>
-                        <p:cond delay="indefinite"/>
-                      </p:stCondLst>
-                      <p:childTnLst>
-                        <p:par>
-                          <p:cTn id="4" fill="hold">
-                            <p:stCondLst>
-                              <p:cond delay="0"/>
-                            </p:stCondLst>
-                            <p:childTnLst>
-                              <p:par>
-                                <p:cTn id="5" presetID="1" presetClass="entr" presetSubtype="0" fill="hold" nodeType="clickEffect">
-                                  <p:stCondLst>
-                                    <p:cond delay="0"/>
-                                  </p:stCondLst>
-                                  <p:childTnLst>
-                                    <p:set>
-                                      <p:cBhvr>
-                                        <p:cTn id="6" dur="1" fill="hold">
-                                          <p:stCondLst>
-                                            <p:cond delay="0"/>
-                                          </p:stCondLst>
-                                        </p:cTn>
-                                        <p:tgtEl>
-                                          <p:spTgt spid="3">
-                                            <p:txEl>
-                                              <p:pRg st="1" end="1"/>
-                                            </p:txEl>
-                                          </p:spTgt>
-                                        </p:tgtEl>
-                                        <p:attrNameLst>
-                                          <p:attrName>style.visibility</p:attrName>
-                                        </p:attrNameLst>
-                                      </p:cBhvr>
-                                      <p:to>
-                                        <p:strVal val="visible"/>
-                                      </p:to>
-                                    </p:set>
-                                  </p:childTnLst>
-                                </p:cTn>
-                              </p:par>
-                            </p:childTnLst>
-                          </p:cTn>
-                        </p:par>
-                      </p:childTnLst>
-                    </p:cTn>
-                  </p:par>
-                  <p:par>
-                    <p:cTn id="7" fill="hold">
-                      <p:stCondLst>
-                        <p:cond delay="indefinite"/>
-                      </p:stCondLst>
-                      <p:childTnLst>
-                        <p:par>
-                          <p:cTn id="8" fill="hold">
-                            <p:stCondLst>
-                              <p:cond delay="0"/>
-                            </p:stCondLst>
-                            <p:childTnLst>
-                              <p:par>
-                                <p:cTn id="9" presetID="1" presetClass="entr" presetSubtype="0" fill="hold" nodeType="clickEffect">
-                                  <p:stCondLst>
-                                    <p:cond delay="0"/>
-                                  </p:stCondLst>
-                                  <p:childTnLst>
-                                    <p:set>
-                                      <p:cBhvr>
-                                        <p:cTn id="10" dur="1" fill="hold">
-                                          <p:stCondLst>
-                                            <p:cond delay="0"/>
-                                          </p:stCondLst>
-                                        </p:cTn>
-                                        <p:tgtEl>
-                                          <p:spTgt spid="3">
-                                            <p:txEl>
-                                              <p:pRg st="2" end="2"/>
-                                            </p:txEl>
-                                          </p:spTgt>
-                                        </p:tgtEl>
-                                        <p:attrNameLst>
-                                          <p:attrName>style.visibility</p:attrName>
-                                        </p:attrNameLst>
-                                      </p:cBhvr>
-                                      <p:to>
-                                        <p:strVal val="visible"/>
-                                      </p:to>
-                                    </p:set>
-                                  </p:childTnLst>
-                                </p:cTn>
-                              </p:par>
-                            </p:childTnLst>
-                          </p:cTn>
-                        </p:par>
-                      </p:childTnLst>
-                    </p:cTn>
-                  </p:par>
-                  <p:par>
-                    <p:cTn id="11" fill="hold">
-                      <p:stCondLst>
-                        <p:cond delay="indefinite"/>
-                      </p:stCondLst>
-                      <p:childTnLst>
-                        <p:par>
-                          <p:cTn id="12" fill="hold">
-                            <p:stCondLst>
-                              <p:cond delay="0"/>
-                            </p:stCondLst>
-                            <p:childTnLst>
-                              <p:par>
-                                <p:cTn id="13" presetID="1" presetClass="entr" presetSubtype="0" fill="hold" nodeType="clickEffect">
-                                  <p:stCondLst>
-                                    <p:cond delay="0"/>
-                                  </p:stCondLst>
-                                  <p:childTnLst>
-                                    <p:set>
-                                      <p:cBhvr>
-                                        <p:cTn id="14" dur="1" fill="hold">
-                                          <p:stCondLst>
-                                            <p:cond delay="0"/>
-                                          </p:stCondLst>
-                                        </p:cTn>
-                                        <p:tgtEl>
-                                          <p:spTgt spid="3">
-                                            <p:txEl>
-                                              <p:pRg st="3" end="3"/>
-                                            </p:txEl>
-                                          </p:spTgt>
-                                        </p:tgtEl>
-                                        <p:attrNameLst>
-                                          <p:attrName>style.visibility</p:attrName>
-                                        </p:attrNameLst>
-                                      </p:cBhvr>
-                                      <p:to>
-                                        <p:strVal val="visible"/>
-                                      </p:to>
-                                    </p:set>
-                                  </p:childTnLst>
-                                </p:cTn>
-                              </p:par>
-                            </p:childTnLst>
-                          </p:cTn>
-                        </p:par>
-                      </p:childTnLst>
-                    </p:cTn>
-                  </p:par>
-                  <p:par>
-                    <p:cTn id="15" fill="hold">
-                      <p:stCondLst>
-                        <p:cond delay="indefinite"/>
-                      </p:stCondLst>
-                      <p:childTnLst>
-                        <p:par>
-                          <p:cTn id="16" fill="hold">
-                            <p:stCondLst>
-                              <p:cond delay="0"/>
-                            </p:stCondLst>
-                            <p:childTnLst>
-                              <p:par>
-                                <p:cTn id="17" presetID="1" presetClass="entr" presetSubtype="0" fill="hold" nodeType="clickEffect">
-                                  <p:stCondLst>
-                                    <p:cond delay="0"/>
-                                  </p:stCondLst>
-                                  <p:childTnLst>
-                                    <p:set>
-                                      <p:cBhvr>
-                                        <p:cTn id="18" dur="1" fill="hold">
-                                          <p:stCondLst>
-                                            <p:cond delay="0"/>
-                                          </p:stCondLst>
-                                        </p:cTn>
-                                        <p:tgtEl>
-                                          <p:spTgt spid="3">
-                                            <p:txEl>
-                                              <p:pRg st="4" end="4"/>
-                                            </p:txEl>
-                                          </p:spTgt>
-                                        </p:tgtEl>
-                                        <p:attrNameLst>
-                                          <p:attrName>style.visibility</p:attrName>
-                                        </p:attrNameLst>
-                                      </p:cBhvr>
-                                      <p:to>
-                                        <p:strVal val="visible"/>
-                                      </p:to>
-                                    </p:set>
-                                  </p:childTnLst>
-                                </p:cTn>
-                              </p:par>
-                            </p:childTnLst>
-                          </p:cTn>
-                        </p:par>
-                      </p:childTnLst>
-                    </p:cTn>
-                  </p:par>
-                  <p:par>
-                    <p:cTn id="19" fill="hold">
-                      <p:stCondLst>
-                        <p:cond delay="indefinite"/>
-                      </p:stCondLst>
-                      <p:childTnLst>
-                        <p:par>
-                          <p:cTn id="20" fill="hold">
-                            <p:stCondLst>
-                              <p:cond delay="0"/>
-                            </p:stCondLst>
-                            <p:childTnLst>
-                              <p:par>
-                                <p:cTn id="21" presetID="1" presetClass="entr" presetSubtype="0" fill="hold" nodeType="clickEffect">
-                                  <p:stCondLst>
-                                    <p:cond delay="0"/>
-                                  </p:stCondLst>
-                                  <p:childTnLst>
-                                    <p:set>
-                                      <p:cBhvr>
-                                        <p:cTn id="22" dur="1" fill="hold">
-                                          <p:stCondLst>
-                                            <p:cond delay="0"/>
-                                          </p:stCondLst>
-                                        </p:cTn>
-                                        <p:tgtEl>
-                                          <p:spTgt spid="3">
-                                            <p:txEl>
-                                              <p:pRg st="5" end="5"/>
-                                            </p:txEl>
-                                          </p:spTgt>
-                                        </p:tgtEl>
-                                        <p:attrNameLst>
-                                          <p:attrName>style.visibility</p:attrName>
-                                        </p:attrNameLst>
-                                      </p:cBhvr>
-                                      <p:to>
-                                        <p:strVal val="visible"/>
-                                      </p:to>
-                                    </p:set>
-                                  </p:childTnLst>
-                                </p:cTn>
-                              </p:par>
-                            </p:childTnLst>
-                          </p:cTn>
-                        </p:par>
-                      </p:childTnLst>
-                    </p:cTn>
-                  </p:par>
-                  <p:par>
-                    <p:cTn id="23" fill="hold">
-                      <p:stCondLst>
-                        <p:cond delay="indefinite"/>
-                      </p:stCondLst>
-                      <p:childTnLst>
-                        <p:par>
-                          <p:cTn id="24" fill="hold">
-                            <p:stCondLst>
-                              <p:cond delay="0"/>
-                            </p:stCondLst>
-                            <p:childTnLst>
-                              <p:par>
-                                <p:cTn id="25" presetID="1" presetClass="entr" presetSubtype="0" fill="hold" nodeType="clickEffect">
-                                  <p:stCondLst>
-                                    <p:cond delay="0"/>
-                                  </p:stCondLst>
-                                  <p:childTnLst>
-                                    <p:set>
-                                      <p:cBhvr>
-                                        <p:cTn id="26" dur="1" fill="hold">
-                                          <p:stCondLst>
-                                            <p:cond delay="0"/>
-                                          </p:stCondLst>
-                                        </p:cTn>
-                                        <p:tgtEl>
-                                          <p:spTgt spid="3">
-                                            <p:txEl>
-                                              <p:pRg st="6" end="6"/>
-                                            </p:txEl>
-                                          </p:spTgt>
-                                        </p:tgtEl>
-                                        <p:attrNameLst>
-                                          <p:attrName>style.visibility</p:attrName>
-                                        </p:attrNameLst>
-                                      </p:cBhvr>
-                                      <p:to>
-                                        <p:strVal val="visible"/>
-                                      </p:to>
-                                    </p:set>
-                                  </p:childTnLst>
-                                </p:cTn>
-                              </p:par>
-                            </p:childTnLst>
-                          </p:cTn>
-                        </p:par>
-                      </p:childTnLst>
-                    </p:cTn>
-                  </p:par>
-                  <p:par>
-                    <p:cTn id="27" fill="hold">
-                      <p:stCondLst>
-                        <p:cond delay="indefinite"/>
-                      </p:stCondLst>
-                      <p:childTnLst>
-                        <p:par>
-                          <p:cTn id="28" fill="hold">
-                            <p:stCondLst>
-                              <p:cond delay="0"/>
-                            </p:stCondLst>
-                            <p:childTnLst>
-                              <p:par>
-                                <p:cTn id="29" presetID="1" presetClass="entr" presetSubtype="0" fill="hold" nodeType="clickEffect">
-                                  <p:stCondLst>
-                                    <p:cond delay="0"/>
-                                  </p:stCondLst>
-                                  <p:childTnLst>
-                                    <p:set>
-                                      <p:cBhvr>
-                                        <p:cTn id="30" dur="1" fill="hold">
-                                          <p:stCondLst>
-                                            <p:cond delay="0"/>
-                                          </p:stCondLst>
-                                        </p:cTn>
-                                        <p:tgtEl>
-                                          <p:spTgt spid="3">
-                                            <p:txEl>
-                                              <p:pRg st="7" end="7"/>
-                                            </p:txEl>
-                                          </p:spTgt>
-                                        </p:tgtEl>
-                                        <p:attrNameLst>
-                                          <p:attrName>style.visibility</p:attrName>
-                                        </p:attrNameLst>
-                                      </p:cBhvr>
-                                      <p:to>
-                                        <p:strVal val="visible"/>
-                                      </p:to>
-                                    </p:set>
-                                  </p:childTnLst>
-                                </p:cTn>
-                              </p:par>
-                            </p:childTnLst>
-                          </p:cTn>
-                        </p:par>
-                      </p:childTnLst>
-                    </p:cTn>
-                  </p:par>
-                  <p:par>
-                    <p:cTn id="31" fill="hold">
-                      <p:stCondLst>
-                        <p:cond delay="indefinite"/>
-                      </p:stCondLst>
-                      <p:childTnLst>
-                        <p:par>
-                          <p:cTn id="32" fill="hold">
-                            <p:stCondLst>
-                              <p:cond delay="0"/>
-                            </p:stCondLst>
-                            <p:childTnLst>
-                              <p:par>
-                                <p:cTn id="33" presetID="1" presetClass="entr" presetSubtype="0" fill="hold" nodeType="clickEffect">
-                                  <p:stCondLst>
-                                    <p:cond delay="0"/>
-                                  </p:stCondLst>
-                                  <p:childTnLst>
-                                    <p:set>
-                                      <p:cBhvr>
-                                        <p:cTn id="34" dur="1" fill="hold">
-                                          <p:stCondLst>
-                                            <p:cond delay="0"/>
-                                          </p:stCondLst>
-                                        </p:cTn>
-                                        <p:tgtEl>
-                                          <p:spTgt spid="3">
-                                            <p:txEl>
-                                              <p:pRg st="8" end="8"/>
-                                            </p:txEl>
-                                          </p:spTgt>
-                                        </p:tgtEl>
-                                        <p:attrNameLst>
-                                          <p:attrName>style.visibility</p:attrName>
-                                        </p:attrNameLst>
-                                      </p:cBhvr>
-                                      <p:to>
-                                        <p:strVal val="visible"/>
-                                      </p:to>
-                                    </p:set>
-                                  </p:childTnLst>
-                                </p:cTn>
-                              </p:par>
-                            </p:childTnLst>
-                          </p:cTn>
-                        </p:par>
-                      </p:childTnLst>
-                    </p:cTn>
-                  </p:par>
-                </p:childTnLst>
-              </p:cTn>
-              <p:prevCondLst>
-                <p:cond evt="onPrev" delay="0">
-                  <p:tgtEl>
-                    <p:sldTgt/>
-                  </p:tgtEl>
-                </p:cond>
-              </p:prevCondLst>
-              <p:nextCondLst>
-                <p:cond evt="onNext" delay="0">
-                  <p:tgtEl>
-                    <p:sldTgt/>
-                  </p:tgtEl>
-                </p:cond>
-              </p:nextCondLst>
-            </p:seq>
-          </p:childTnLst>
-        </p:cTn>
-      </p:par>
-    </p:tnLst>
-  </p:timing>
-</p:sld>
-</file>
-
-<file path=ppt/slides/slide40.xml><?xml version="1.0" encoding="utf-8"?>
-<p:sld xmlns:a="http://schemas.openxmlformats.org/drawingml/2006/main" xmlns:r="http://schemas.openxmlformats.org/officeDocument/2006/relationships" xmlns:p="http://schemas.openxmlformats.org/presentationml/2006/main">
-  <p:cSld>
-    <p:spTree>
-      <p:nvGrpSpPr>
-        <p:cNvPr id="1" name=""/>
-        <p:cNvGrpSpPr/>
-        <p:nvPr/>
-      </p:nvGrpSpPr>
-      <p:grpSpPr>
-        <a:xfrm>
-          <a:off x="0" y="0"/>
-          <a:ext cx="0" cy="0"/>
-          <a:chOff x="0" y="0"/>
-          <a:chExt cx="0" cy="0"/>
-        </a:xfrm>
-      </p:grpSpPr>
-      <p:sp>
-        <p:nvSpPr>
-          <p:cNvPr id="2" name="Title 1"/>
-          <p:cNvSpPr>
-            <a:spLocks noGrp="1"/>
-          </p:cNvSpPr>
-          <p:nvPr>
-            <p:ph type="title"/>
-          </p:nvPr>
-        </p:nvSpPr>
-        <p:spPr>
-          <a:xfrm>
-            <a:off x="584200" y="221992"/>
-            <a:ext cx="10515600" cy="530954"/>
-          </a:xfrm>
-        </p:spPr>
-        <p:txBody>
-          <a:bodyPr>
-            <a:normAutofit fontScale="90000"/>
-          </a:bodyPr>
-          <a:lstStyle/>
-          <a:p>
-            <a:r>
-              <a:rPr lang="en-US" dirty="0"/>
-              <a:t>Kernels nonlinear separation</a:t>
-            </a:r>
-          </a:p>
-        </p:txBody>
-      </p:sp>
-      <mc:AlternateContent xmlns:mc="http://schemas.openxmlformats.org/markup-compatibility/2006">
-        <mc:Choice xmlns:a14="http://schemas.microsoft.com/office/drawing/2010/main" Requires="a14">
+      <mc:AlternateContent xmlns:mc="http://schemas.openxmlformats.org/markup-compatibility/2006" xmlns:a14="http://schemas.microsoft.com/office/drawing/2010/main">
+        <mc:Choice Requires="a14">
           <p:sp>
             <p:nvSpPr>
               <p:cNvPr id="3" name="Content Placeholder 2"/>
@@ -38180,7 +39208,7 @@
             </p:txBody>
           </p:sp>
         </mc:Choice>
-        <mc:Fallback>
+        <mc:Fallback xmlns="">
           <p:sp>
             <p:nvSpPr>
               <p:cNvPr id="3" name="Content Placeholder 2"/>
@@ -38408,7 +39436,7 @@
 </p:sld>
 </file>
 
-<file path=ppt/slides/slide41.xml><?xml version="1.0" encoding="utf-8"?>
+<file path=ppt/slides/slide42.xml><?xml version="1.0" encoding="utf-8"?>
 <p:sld xmlns:a="http://schemas.openxmlformats.org/drawingml/2006/main" xmlns:r="http://schemas.openxmlformats.org/officeDocument/2006/relationships" xmlns:p="http://schemas.openxmlformats.org/presentationml/2006/main">
   <p:cSld>
     <p:spTree>
@@ -38459,8 +39487,8 @@
           </a:p>
         </p:txBody>
       </p:sp>
-      <mc:AlternateContent xmlns:mc="http://schemas.openxmlformats.org/markup-compatibility/2006">
-        <mc:Choice xmlns:a14="http://schemas.microsoft.com/office/drawing/2010/main" Requires="a14">
+      <mc:AlternateContent xmlns:mc="http://schemas.openxmlformats.org/markup-compatibility/2006" xmlns:a14="http://schemas.microsoft.com/office/drawing/2010/main">
+        <mc:Choice Requires="a14">
           <p:sp>
             <p:nvSpPr>
               <p:cNvPr id="3" name="Content Placeholder 2"/>
@@ -40008,7 +41036,7 @@
             </p:txBody>
           </p:sp>
         </mc:Choice>
-        <mc:Fallback>
+        <mc:Fallback xmlns="">
           <p:sp>
             <p:nvSpPr>
               <p:cNvPr id="3" name="Content Placeholder 2"/>
@@ -40476,7 +41504,851 @@
 </p:sld>
 </file>
 
-<file path=ppt/slides/slide42.xml><?xml version="1.0" encoding="utf-8"?>
+<file path=ppt/slides/slide43.xml><?xml version="1.0" encoding="utf-8"?>
+<p:sld xmlns:a="http://schemas.openxmlformats.org/drawingml/2006/main" xmlns:r="http://schemas.openxmlformats.org/officeDocument/2006/relationships" xmlns:p="http://schemas.openxmlformats.org/presentationml/2006/main">
+  <p:cSld>
+    <p:spTree>
+      <p:nvGrpSpPr>
+        <p:cNvPr id="1" name=""/>
+        <p:cNvGrpSpPr/>
+        <p:nvPr/>
+      </p:nvGrpSpPr>
+      <p:grpSpPr>
+        <a:xfrm>
+          <a:off x="0" y="0"/>
+          <a:ext cx="0" cy="0"/>
+          <a:chOff x="0" y="0"/>
+          <a:chExt cx="0" cy="0"/>
+        </a:xfrm>
+      </p:grpSpPr>
+      <p:sp>
+        <p:nvSpPr>
+          <p:cNvPr id="2" name="Title 1"/>
+          <p:cNvSpPr>
+            <a:spLocks noGrp="1"/>
+          </p:cNvSpPr>
+          <p:nvPr>
+            <p:ph type="title"/>
+          </p:nvPr>
+        </p:nvSpPr>
+        <p:spPr>
+          <a:xfrm>
+            <a:off x="584200" y="221992"/>
+            <a:ext cx="10515600" cy="530954"/>
+          </a:xfrm>
+        </p:spPr>
+        <p:txBody>
+          <a:bodyPr>
+            <a:noAutofit/>
+          </a:bodyPr>
+          <a:lstStyle/>
+          <a:p>
+            <a:r>
+              <a:rPr lang="en-US" sz="3600" dirty="0"/>
+              <a:t>Kernel Principle Component Decomposition</a:t>
+            </a:r>
+          </a:p>
+        </p:txBody>
+      </p:sp>
+      <mc:AlternateContent xmlns:mc="http://schemas.openxmlformats.org/markup-compatibility/2006">
+        <mc:Choice xmlns:a14="http://schemas.microsoft.com/office/drawing/2010/main" Requires="a14">
+          <p:sp>
+            <p:nvSpPr>
+              <p:cNvPr id="3" name="Content Placeholder 2"/>
+              <p:cNvSpPr>
+                <a:spLocks noGrp="1"/>
+              </p:cNvSpPr>
+              <p:nvPr>
+                <p:ph sz="quarter" idx="10"/>
+              </p:nvPr>
+            </p:nvSpPr>
+            <p:spPr>
+              <a:xfrm>
+                <a:off x="333375" y="1004777"/>
+                <a:ext cx="11525250" cy="5181690"/>
+              </a:xfrm>
+            </p:spPr>
+            <p:txBody>
+              <a:bodyPr>
+                <a:normAutofit/>
+              </a:bodyPr>
+              <a:lstStyle/>
+              <a:p>
+                <a:pPr marL="0" indent="0">
+                  <a:buNone/>
+                </a:pPr>
+                <a:r>
+                  <a:rPr lang="en-US" dirty="0">
+                    <a:latin typeface="+mn-lt"/>
+                  </a:rPr>
+                  <a:t>What are the properties of kernel principle component decomposition?</a:t>
+                </a:r>
+              </a:p>
+              <a:p>
+                <a:r>
+                  <a:rPr lang="en-US" dirty="0">
+                    <a:latin typeface="+mn-lt"/>
+                  </a:rPr>
+                  <a:t>Kernel PCA is a nonlinear projection from high dimensional space to low dimensional space</a:t>
+                </a:r>
+              </a:p>
+              <a:p>
+                <a:pPr marL="0" indent="0">
+                  <a:buNone/>
+                </a:pPr>
+                <a14:m>
+                  <m:oMathPara xmlns:m="http://schemas.openxmlformats.org/officeDocument/2006/math">
+                    <m:oMathParaPr>
+                      <m:jc m:val="centerGroup"/>
+                    </m:oMathParaPr>
+                    <m:oMath xmlns:m="http://schemas.openxmlformats.org/officeDocument/2006/math">
+                      <m:r>
+                        <a:rPr lang="en-US" i="1">
+                          <a:latin typeface="Cambria Math" panose="02040503050406030204" pitchFamily="18" charset="0"/>
+                          <a:cs typeface="Segoe UI" panose="020B0502040204020203" pitchFamily="34" charset="0"/>
+                        </a:rPr>
+                        <m:t>𝑇</m:t>
+                      </m:r>
+                      <m:r>
+                        <a:rPr lang="en-US" i="1">
+                          <a:latin typeface="Cambria Math" panose="02040503050406030204" pitchFamily="18" charset="0"/>
+                          <a:cs typeface="Segoe UI" panose="020B0502040204020203" pitchFamily="34" charset="0"/>
+                        </a:rPr>
+                        <m:t>=</m:t>
+                      </m:r>
+                      <m:r>
+                        <a:rPr lang="en-US" b="0" i="1" smtClean="0">
+                          <a:latin typeface="Cambria Math" panose="02040503050406030204" pitchFamily="18" charset="0"/>
+                          <a:cs typeface="Segoe UI" panose="020B0502040204020203" pitchFamily="34" charset="0"/>
+                        </a:rPr>
+                        <m:t>𝑓</m:t>
+                      </m:r>
+                      <m:r>
+                        <a:rPr lang="en-US" b="0" i="1" smtClean="0">
+                          <a:latin typeface="Cambria Math" panose="02040503050406030204" pitchFamily="18" charset="0"/>
+                          <a:cs typeface="Segoe UI" panose="020B0502040204020203" pitchFamily="34" charset="0"/>
+                        </a:rPr>
+                        <m:t>(</m:t>
+                      </m:r>
+                      <m:r>
+                        <a:rPr lang="en-US" i="1">
+                          <a:latin typeface="Cambria Math" panose="02040503050406030204" pitchFamily="18" charset="0"/>
+                          <a:cs typeface="Segoe UI" panose="020B0502040204020203" pitchFamily="34" charset="0"/>
+                        </a:rPr>
+                        <m:t>𝑋</m:t>
+                      </m:r>
+                      <m:r>
+                        <a:rPr lang="en-US" b="0" i="1" smtClean="0">
+                          <a:latin typeface="Cambria Math" panose="02040503050406030204" pitchFamily="18" charset="0"/>
+                          <a:cs typeface="Segoe UI" panose="020B0502040204020203" pitchFamily="34" charset="0"/>
+                        </a:rPr>
+                        <m:t>) </m:t>
+                      </m:r>
+                      <m:r>
+                        <a:rPr lang="en-US" b="0" i="1" smtClean="0">
+                          <a:latin typeface="Cambria Math" panose="02040503050406030204" pitchFamily="18" charset="0"/>
+                          <a:cs typeface="Segoe UI" panose="020B0502040204020203" pitchFamily="34" charset="0"/>
+                        </a:rPr>
+                        <m:t>𝑓𝑜𝑟</m:t>
+                      </m:r>
+                      <m:r>
+                        <a:rPr lang="en-US" b="0" i="1" smtClean="0">
+                          <a:latin typeface="Cambria Math" panose="02040503050406030204" pitchFamily="18" charset="0"/>
+                          <a:cs typeface="Segoe UI" panose="020B0502040204020203" pitchFamily="34" charset="0"/>
+                        </a:rPr>
+                        <m:t> </m:t>
+                      </m:r>
+                      <m:r>
+                        <a:rPr lang="en-US" b="0" i="1" smtClean="0">
+                          <a:latin typeface="Cambria Math" panose="02040503050406030204" pitchFamily="18" charset="0"/>
+                          <a:cs typeface="Segoe UI" panose="020B0502040204020203" pitchFamily="34" charset="0"/>
+                        </a:rPr>
+                        <m:t>𝑋</m:t>
+                      </m:r>
+                      <m:r>
+                        <a:rPr lang="en-US" b="0" i="1" smtClean="0">
+                          <a:latin typeface="Cambria Math" panose="02040503050406030204" pitchFamily="18" charset="0"/>
+                          <a:cs typeface="Segoe UI" panose="020B0502040204020203" pitchFamily="34" charset="0"/>
+                        </a:rPr>
+                        <m:t> </m:t>
+                      </m:r>
+                      <m:r>
+                        <a:rPr lang="en-US" b="0" i="1" smtClean="0">
+                          <a:latin typeface="Cambria Math" panose="02040503050406030204" pitchFamily="18" charset="0"/>
+                          <a:cs typeface="Segoe UI" panose="020B0502040204020203" pitchFamily="34" charset="0"/>
+                        </a:rPr>
+                        <m:t>𝑖𝑛</m:t>
+                      </m:r>
+                      <m:r>
+                        <a:rPr lang="en-US" b="0" i="1" smtClean="0">
+                          <a:latin typeface="Cambria Math" panose="02040503050406030204" pitchFamily="18" charset="0"/>
+                          <a:cs typeface="Segoe UI" panose="020B0502040204020203" pitchFamily="34" charset="0"/>
+                        </a:rPr>
+                        <m:t> </m:t>
+                      </m:r>
+                      <m:sSup>
+                        <m:sSupPr>
+                          <m:ctrlPr>
+                            <a:rPr lang="en-US" b="0" i="1" smtClean="0">
+                              <a:latin typeface="Cambria Math" panose="02040503050406030204" pitchFamily="18" charset="0"/>
+                              <a:cs typeface="Segoe UI" panose="020B0502040204020203" pitchFamily="34" charset="0"/>
+                            </a:rPr>
+                          </m:ctrlPr>
+                        </m:sSupPr>
+                        <m:e>
+                          <m:r>
+                            <a:rPr lang="en-US" b="0" i="1" smtClean="0">
+                              <a:latin typeface="Cambria Math" panose="02040503050406030204" pitchFamily="18" charset="0"/>
+                              <a:ea typeface="Cambria Math" panose="02040503050406030204" pitchFamily="18" charset="0"/>
+                              <a:cs typeface="Segoe UI" panose="020B0502040204020203" pitchFamily="34" charset="0"/>
+                            </a:rPr>
+                            <m:t>ℝ</m:t>
+                          </m:r>
+                        </m:e>
+                        <m:sup>
+                          <m:r>
+                            <a:rPr lang="en-US" b="0" i="1" smtClean="0">
+                              <a:latin typeface="Cambria Math" panose="02040503050406030204" pitchFamily="18" charset="0"/>
+                              <a:cs typeface="Segoe UI" panose="020B0502040204020203" pitchFamily="34" charset="0"/>
+                            </a:rPr>
+                            <m:t>𝑛</m:t>
+                          </m:r>
+                        </m:sup>
+                      </m:sSup>
+                      <m:r>
+                        <a:rPr lang="en-US" b="0" i="1" smtClean="0">
+                          <a:latin typeface="Cambria Math" panose="02040503050406030204" pitchFamily="18" charset="0"/>
+                          <a:cs typeface="Segoe UI" panose="020B0502040204020203" pitchFamily="34" charset="0"/>
+                        </a:rPr>
+                        <m:t> </m:t>
+                      </m:r>
+                      <m:r>
+                        <a:rPr lang="en-US" b="0" i="1" smtClean="0">
+                          <a:latin typeface="Cambria Math" panose="02040503050406030204" pitchFamily="18" charset="0"/>
+                          <a:cs typeface="Segoe UI" panose="020B0502040204020203" pitchFamily="34" charset="0"/>
+                        </a:rPr>
+                        <m:t>𝑇</m:t>
+                      </m:r>
+                      <m:r>
+                        <a:rPr lang="en-US" b="0" i="1" smtClean="0">
+                          <a:latin typeface="Cambria Math" panose="02040503050406030204" pitchFamily="18" charset="0"/>
+                          <a:cs typeface="Segoe UI" panose="020B0502040204020203" pitchFamily="34" charset="0"/>
+                        </a:rPr>
+                        <m:t> </m:t>
+                      </m:r>
+                      <m:r>
+                        <a:rPr lang="en-US" b="0" i="1" smtClean="0">
+                          <a:latin typeface="Cambria Math" panose="02040503050406030204" pitchFamily="18" charset="0"/>
+                          <a:cs typeface="Segoe UI" panose="020B0502040204020203" pitchFamily="34" charset="0"/>
+                        </a:rPr>
+                        <m:t>𝑖𝑛</m:t>
+                      </m:r>
+                      <m:r>
+                        <a:rPr lang="en-US" b="0" i="1" smtClean="0">
+                          <a:latin typeface="Cambria Math" panose="02040503050406030204" pitchFamily="18" charset="0"/>
+                          <a:cs typeface="Segoe UI" panose="020B0502040204020203" pitchFamily="34" charset="0"/>
+                        </a:rPr>
+                        <m:t> </m:t>
+                      </m:r>
+                      <m:sSup>
+                        <m:sSupPr>
+                          <m:ctrlPr>
+                            <a:rPr lang="en-US" b="0" i="1" smtClean="0">
+                              <a:latin typeface="Cambria Math" panose="02040503050406030204" pitchFamily="18" charset="0"/>
+                              <a:cs typeface="Segoe UI" panose="020B0502040204020203" pitchFamily="34" charset="0"/>
+                            </a:rPr>
+                          </m:ctrlPr>
+                        </m:sSupPr>
+                        <m:e>
+                          <m:r>
+                            <a:rPr lang="en-US" b="0" i="1" smtClean="0">
+                              <a:latin typeface="Cambria Math" panose="02040503050406030204" pitchFamily="18" charset="0"/>
+                              <a:ea typeface="Cambria Math" panose="02040503050406030204" pitchFamily="18" charset="0"/>
+                              <a:cs typeface="Segoe UI" panose="020B0502040204020203" pitchFamily="34" charset="0"/>
+                            </a:rPr>
+                            <m:t>ℝ</m:t>
+                          </m:r>
+                        </m:e>
+                        <m:sup>
+                          <m:r>
+                            <a:rPr lang="en-US" b="0" i="1" smtClean="0">
+                              <a:latin typeface="Cambria Math" panose="02040503050406030204" pitchFamily="18" charset="0"/>
+                              <a:cs typeface="Segoe UI" panose="020B0502040204020203" pitchFamily="34" charset="0"/>
+                            </a:rPr>
+                            <m:t>𝑙</m:t>
+                          </m:r>
+                        </m:sup>
+                      </m:sSup>
+                      <m:r>
+                        <a:rPr lang="en-US" b="0" i="1" smtClean="0">
+                          <a:latin typeface="Cambria Math" panose="02040503050406030204" pitchFamily="18" charset="0"/>
+                          <a:cs typeface="Segoe UI" panose="020B0502040204020203" pitchFamily="34" charset="0"/>
+                        </a:rPr>
+                        <m:t>, </m:t>
+                      </m:r>
+                      <m:r>
+                        <a:rPr lang="en-US" b="0" i="1" smtClean="0">
+                          <a:latin typeface="Cambria Math" panose="02040503050406030204" pitchFamily="18" charset="0"/>
+                          <a:cs typeface="Segoe UI" panose="020B0502040204020203" pitchFamily="34" charset="0"/>
+                        </a:rPr>
+                        <m:t>𝑛</m:t>
+                      </m:r>
+                      <m:r>
+                        <a:rPr lang="en-US" b="0" i="1" smtClean="0">
+                          <a:latin typeface="Cambria Math" panose="02040503050406030204" pitchFamily="18" charset="0"/>
+                          <a:ea typeface="Cambria Math" panose="02040503050406030204" pitchFamily="18" charset="0"/>
+                          <a:cs typeface="Segoe UI" panose="020B0502040204020203" pitchFamily="34" charset="0"/>
+                        </a:rPr>
+                        <m:t>≫</m:t>
+                      </m:r>
+                      <m:r>
+                        <a:rPr lang="en-US" b="0" i="1" smtClean="0">
+                          <a:latin typeface="Cambria Math" panose="02040503050406030204" pitchFamily="18" charset="0"/>
+                          <a:ea typeface="Cambria Math" panose="02040503050406030204" pitchFamily="18" charset="0"/>
+                          <a:cs typeface="Segoe UI" panose="020B0502040204020203" pitchFamily="34" charset="0"/>
+                        </a:rPr>
+                        <m:t>𝑙</m:t>
+                      </m:r>
+                      <m:r>
+                        <a:rPr lang="en-US" b="0" i="1" smtClean="0">
+                          <a:latin typeface="Cambria Math" panose="02040503050406030204" pitchFamily="18" charset="0"/>
+                          <a:cs typeface="Segoe UI" panose="020B0502040204020203" pitchFamily="34" charset="0"/>
+                        </a:rPr>
+                        <m:t> </m:t>
+                      </m:r>
+                    </m:oMath>
+                  </m:oMathPara>
+                </a14:m>
+                <a:endParaRPr lang="en-US" dirty="0">
+                  <a:latin typeface="+mn-lt"/>
+                </a:endParaRPr>
+              </a:p>
+              <a:p>
+                <a:pPr lvl="1"/>
+                <a:r>
+                  <a:rPr lang="en-US" dirty="0">
+                    <a:latin typeface="+mn-lt"/>
+                  </a:rPr>
+                  <a:t>A good more only if </a:t>
+                </a:r>
+                <a:r>
+                  <a:rPr lang="en-US" b="1" dirty="0">
+                    <a:latin typeface="+mn-lt"/>
+                  </a:rPr>
+                  <a:t>kernel is good approximation of dependency between variables   </a:t>
+                </a:r>
+              </a:p>
+              <a:p>
+                <a:r>
+                  <a:rPr lang="en-US" dirty="0">
+                    <a:latin typeface="+mn-lt"/>
+                  </a:rPr>
+                  <a:t>Kernel PCA </a:t>
+                </a:r>
+                <a:r>
+                  <a:rPr lang="en-US" b="1" dirty="0">
+                    <a:latin typeface="+mn-lt"/>
+                  </a:rPr>
+                  <a:t>minimizes least square error </a:t>
+                </a:r>
+                <a:r>
+                  <a:rPr lang="en-US" dirty="0">
+                    <a:latin typeface="+mn-lt"/>
+                  </a:rPr>
+                  <a:t>with original data  </a:t>
+                </a:r>
+              </a:p>
+              <a:p>
+                <a:pPr lvl="1"/>
+                <a:r>
+                  <a:rPr lang="en-US" dirty="0">
+                    <a:latin typeface="+mn-lt"/>
+                  </a:rPr>
+                  <a:t>Appropriate only for </a:t>
+                </a:r>
+                <a:r>
+                  <a:rPr lang="en-US" b="1" dirty="0">
+                    <a:latin typeface="+mn-lt"/>
+                  </a:rPr>
+                  <a:t>Euclidean space  </a:t>
+                </a:r>
+              </a:p>
+              <a:p>
+                <a:r>
+                  <a:rPr lang="en-US" dirty="0">
+                    <a:latin typeface="+mn-lt"/>
+                  </a:rPr>
+                  <a:t>Kernel PCA </a:t>
+                </a:r>
+                <a:r>
+                  <a:rPr lang="en-US" b="1" dirty="0">
+                    <a:latin typeface="+mn-lt"/>
+                  </a:rPr>
+                  <a:t>approximately preserves distances</a:t>
+                </a:r>
+              </a:p>
+              <a:p>
+                <a:pPr lvl="1"/>
+                <a:r>
+                  <a:rPr lang="en-US" dirty="0">
+                    <a:latin typeface="+mn-lt"/>
+                  </a:rPr>
+                  <a:t>Distances are preserved within the error of the transformation  </a:t>
+                </a:r>
+              </a:p>
+              <a:p>
+                <a:r>
+                  <a:rPr lang="en-US" dirty="0">
+                    <a:latin typeface="+mn-lt"/>
+                  </a:rPr>
+                  <a:t>Kernel PCA is computationally efficient</a:t>
+                </a:r>
+              </a:p>
+              <a:p>
+                <a:pPr lvl="1"/>
+                <a:r>
+                  <a:rPr lang="en-US" dirty="0">
+                    <a:latin typeface="+mn-lt"/>
+                  </a:rPr>
+                  <a:t>Kernel trick creates linear transformation </a:t>
+                </a:r>
+              </a:p>
+            </p:txBody>
+          </p:sp>
+        </mc:Choice>
+        <mc:Fallback>
+          <p:sp>
+            <p:nvSpPr>
+              <p:cNvPr id="3" name="Content Placeholder 2"/>
+              <p:cNvSpPr>
+                <a:spLocks noGrp="1" noRot="1" noChangeAspect="1" noMove="1" noResize="1" noEditPoints="1" noAdjustHandles="1" noChangeArrowheads="1" noChangeShapeType="1" noTextEdit="1"/>
+              </p:cNvSpPr>
+              <p:nvPr>
+                <p:ph sz="quarter" idx="10"/>
+              </p:nvPr>
+            </p:nvSpPr>
+            <p:spPr>
+              <a:xfrm>
+                <a:off x="333375" y="1004777"/>
+                <a:ext cx="11525250" cy="5181690"/>
+              </a:xfrm>
+              <a:blipFill>
+                <a:blip r:embed="rId3"/>
+                <a:stretch>
+                  <a:fillRect l="-1111" t="-2000" r="-1376" b="-471"/>
+                </a:stretch>
+              </a:blipFill>
+            </p:spPr>
+            <p:txBody>
+              <a:bodyPr/>
+              <a:lstStyle/>
+              <a:p>
+                <a:r>
+                  <a:rPr lang="en-US">
+                    <a:noFill/>
+                  </a:rPr>
+                  <a:t> </a:t>
+                </a:r>
+              </a:p>
+            </p:txBody>
+          </p:sp>
+        </mc:Fallback>
+      </mc:AlternateContent>
+    </p:spTree>
+    <p:extLst>
+      <p:ext uri="{BB962C8B-B14F-4D97-AF65-F5344CB8AC3E}">
+        <p14:creationId xmlns:p14="http://schemas.microsoft.com/office/powerpoint/2010/main" val="3509434258"/>
+      </p:ext>
+    </p:extLst>
+  </p:cSld>
+  <p:clrMapOvr>
+    <a:masterClrMapping/>
+  </p:clrMapOvr>
+  <p:timing>
+    <p:tnLst>
+      <p:par>
+        <p:cTn id="1" dur="indefinite" restart="never" nodeType="tmRoot">
+          <p:childTnLst>
+            <p:seq concurrent="1" nextAc="seek">
+              <p:cTn id="2" dur="indefinite" nodeType="mainSeq">
+                <p:childTnLst>
+                  <p:par>
+                    <p:cTn id="3" fill="hold">
+                      <p:stCondLst>
+                        <p:cond delay="indefinite"/>
+                      </p:stCondLst>
+                      <p:childTnLst>
+                        <p:par>
+                          <p:cTn id="4" fill="hold">
+                            <p:stCondLst>
+                              <p:cond delay="0"/>
+                            </p:stCondLst>
+                            <p:childTnLst>
+                              <p:par>
+                                <p:cTn id="5" presetID="1" presetClass="entr" presetSubtype="0" fill="hold" nodeType="clickEffect">
+                                  <p:stCondLst>
+                                    <p:cond delay="0"/>
+                                  </p:stCondLst>
+                                  <p:childTnLst>
+                                    <p:set>
+                                      <p:cBhvr>
+                                        <p:cTn id="6" dur="1" fill="hold">
+                                          <p:stCondLst>
+                                            <p:cond delay="0"/>
+                                          </p:stCondLst>
+                                        </p:cTn>
+                                        <p:tgtEl>
+                                          <p:spTgt spid="3">
+                                            <p:txEl>
+                                              <p:pRg st="1" end="1"/>
+                                            </p:txEl>
+                                          </p:spTgt>
+                                        </p:tgtEl>
+                                        <p:attrNameLst>
+                                          <p:attrName>style.visibility</p:attrName>
+                                        </p:attrNameLst>
+                                      </p:cBhvr>
+                                      <p:to>
+                                        <p:strVal val="visible"/>
+                                      </p:to>
+                                    </p:set>
+                                  </p:childTnLst>
+                                </p:cTn>
+                              </p:par>
+                              <p:par>
+                                <p:cTn id="7" presetID="1" presetClass="entr" presetSubtype="0" fill="hold" nodeType="withEffect">
+                                  <p:stCondLst>
+                                    <p:cond delay="0"/>
+                                  </p:stCondLst>
+                                  <p:childTnLst>
+                                    <p:set>
+                                      <p:cBhvr>
+                                        <p:cTn id="8" dur="1" fill="hold">
+                                          <p:stCondLst>
+                                            <p:cond delay="0"/>
+                                          </p:stCondLst>
+                                        </p:cTn>
+                                        <p:tgtEl>
+                                          <p:spTgt spid="3">
+                                            <p:txEl>
+                                              <p:pRg st="2" end="2"/>
+                                            </p:txEl>
+                                          </p:spTgt>
+                                        </p:tgtEl>
+                                        <p:attrNameLst>
+                                          <p:attrName>style.visibility</p:attrName>
+                                        </p:attrNameLst>
+                                      </p:cBhvr>
+                                      <p:to>
+                                        <p:strVal val="visible"/>
+                                      </p:to>
+                                    </p:set>
+                                  </p:childTnLst>
+                                </p:cTn>
+                              </p:par>
+                              <p:par>
+                                <p:cTn id="9" presetID="1" presetClass="entr" presetSubtype="0" fill="hold" nodeType="withEffect">
+                                  <p:stCondLst>
+                                    <p:cond delay="0"/>
+                                  </p:stCondLst>
+                                  <p:childTnLst>
+                                    <p:set>
+                                      <p:cBhvr>
+                                        <p:cTn id="10" dur="1" fill="hold">
+                                          <p:stCondLst>
+                                            <p:cond delay="0"/>
+                                          </p:stCondLst>
+                                        </p:cTn>
+                                        <p:tgtEl>
+                                          <p:spTgt spid="3">
+                                            <p:txEl>
+                                              <p:pRg st="3" end="3"/>
+                                            </p:txEl>
+                                          </p:spTgt>
+                                        </p:tgtEl>
+                                        <p:attrNameLst>
+                                          <p:attrName>style.visibility</p:attrName>
+                                        </p:attrNameLst>
+                                      </p:cBhvr>
+                                      <p:to>
+                                        <p:strVal val="visible"/>
+                                      </p:to>
+                                    </p:set>
+                                  </p:childTnLst>
+                                </p:cTn>
+                              </p:par>
+                            </p:childTnLst>
+                          </p:cTn>
+                        </p:par>
+                      </p:childTnLst>
+                    </p:cTn>
+                  </p:par>
+                  <p:par>
+                    <p:cTn id="11" fill="hold">
+                      <p:stCondLst>
+                        <p:cond delay="indefinite"/>
+                      </p:stCondLst>
+                      <p:childTnLst>
+                        <p:par>
+                          <p:cTn id="12" fill="hold">
+                            <p:stCondLst>
+                              <p:cond delay="0"/>
+                            </p:stCondLst>
+                            <p:childTnLst>
+                              <p:par>
+                                <p:cTn id="13" presetID="1" presetClass="entr" presetSubtype="0" fill="hold" nodeType="clickEffect">
+                                  <p:stCondLst>
+                                    <p:cond delay="0"/>
+                                  </p:stCondLst>
+                                  <p:childTnLst>
+                                    <p:set>
+                                      <p:cBhvr>
+                                        <p:cTn id="14" dur="1" fill="hold">
+                                          <p:stCondLst>
+                                            <p:cond delay="0"/>
+                                          </p:stCondLst>
+                                        </p:cTn>
+                                        <p:tgtEl>
+                                          <p:spTgt spid="3">
+                                            <p:txEl>
+                                              <p:pRg st="4" end="4"/>
+                                            </p:txEl>
+                                          </p:spTgt>
+                                        </p:tgtEl>
+                                        <p:attrNameLst>
+                                          <p:attrName>style.visibility</p:attrName>
+                                        </p:attrNameLst>
+                                      </p:cBhvr>
+                                      <p:to>
+                                        <p:strVal val="visible"/>
+                                      </p:to>
+                                    </p:set>
+                                  </p:childTnLst>
+                                </p:cTn>
+                              </p:par>
+                              <p:par>
+                                <p:cTn id="15" presetID="1" presetClass="entr" presetSubtype="0" fill="hold" nodeType="withEffect">
+                                  <p:stCondLst>
+                                    <p:cond delay="0"/>
+                                  </p:stCondLst>
+                                  <p:childTnLst>
+                                    <p:set>
+                                      <p:cBhvr>
+                                        <p:cTn id="16" dur="1" fill="hold">
+                                          <p:stCondLst>
+                                            <p:cond delay="0"/>
+                                          </p:stCondLst>
+                                        </p:cTn>
+                                        <p:tgtEl>
+                                          <p:spTgt spid="3">
+                                            <p:txEl>
+                                              <p:pRg st="5" end="5"/>
+                                            </p:txEl>
+                                          </p:spTgt>
+                                        </p:tgtEl>
+                                        <p:attrNameLst>
+                                          <p:attrName>style.visibility</p:attrName>
+                                        </p:attrNameLst>
+                                      </p:cBhvr>
+                                      <p:to>
+                                        <p:strVal val="visible"/>
+                                      </p:to>
+                                    </p:set>
+                                  </p:childTnLst>
+                                </p:cTn>
+                              </p:par>
+                            </p:childTnLst>
+                          </p:cTn>
+                        </p:par>
+                      </p:childTnLst>
+                    </p:cTn>
+                  </p:par>
+                  <p:par>
+                    <p:cTn id="17" fill="hold">
+                      <p:stCondLst>
+                        <p:cond delay="indefinite"/>
+                      </p:stCondLst>
+                      <p:childTnLst>
+                        <p:par>
+                          <p:cTn id="18" fill="hold">
+                            <p:stCondLst>
+                              <p:cond delay="0"/>
+                            </p:stCondLst>
+                            <p:childTnLst>
+                              <p:par>
+                                <p:cTn id="19" presetID="1" presetClass="entr" presetSubtype="0" fill="hold" nodeType="clickEffect">
+                                  <p:stCondLst>
+                                    <p:cond delay="0"/>
+                                  </p:stCondLst>
+                                  <p:childTnLst>
+                                    <p:set>
+                                      <p:cBhvr>
+                                        <p:cTn id="20" dur="1" fill="hold">
+                                          <p:stCondLst>
+                                            <p:cond delay="0"/>
+                                          </p:stCondLst>
+                                        </p:cTn>
+                                        <p:tgtEl>
+                                          <p:spTgt spid="3">
+                                            <p:txEl>
+                                              <p:pRg st="6" end="6"/>
+                                            </p:txEl>
+                                          </p:spTgt>
+                                        </p:tgtEl>
+                                        <p:attrNameLst>
+                                          <p:attrName>style.visibility</p:attrName>
+                                        </p:attrNameLst>
+                                      </p:cBhvr>
+                                      <p:to>
+                                        <p:strVal val="visible"/>
+                                      </p:to>
+                                    </p:set>
+                                  </p:childTnLst>
+                                </p:cTn>
+                              </p:par>
+                              <p:par>
+                                <p:cTn id="21" presetID="1" presetClass="entr" presetSubtype="0" fill="hold" nodeType="withEffect">
+                                  <p:stCondLst>
+                                    <p:cond delay="0"/>
+                                  </p:stCondLst>
+                                  <p:childTnLst>
+                                    <p:set>
+                                      <p:cBhvr>
+                                        <p:cTn id="22" dur="1" fill="hold">
+                                          <p:stCondLst>
+                                            <p:cond delay="0"/>
+                                          </p:stCondLst>
+                                        </p:cTn>
+                                        <p:tgtEl>
+                                          <p:spTgt spid="3">
+                                            <p:txEl>
+                                              <p:pRg st="7" end="7"/>
+                                            </p:txEl>
+                                          </p:spTgt>
+                                        </p:tgtEl>
+                                        <p:attrNameLst>
+                                          <p:attrName>style.visibility</p:attrName>
+                                        </p:attrNameLst>
+                                      </p:cBhvr>
+                                      <p:to>
+                                        <p:strVal val="visible"/>
+                                      </p:to>
+                                    </p:set>
+                                  </p:childTnLst>
+                                </p:cTn>
+                              </p:par>
+                            </p:childTnLst>
+                          </p:cTn>
+                        </p:par>
+                      </p:childTnLst>
+                    </p:cTn>
+                  </p:par>
+                  <p:par>
+                    <p:cTn id="23" fill="hold">
+                      <p:stCondLst>
+                        <p:cond delay="indefinite"/>
+                      </p:stCondLst>
+                      <p:childTnLst>
+                        <p:par>
+                          <p:cTn id="24" fill="hold">
+                            <p:stCondLst>
+                              <p:cond delay="0"/>
+                            </p:stCondLst>
+                            <p:childTnLst>
+                              <p:par>
+                                <p:cTn id="25" presetID="1" presetClass="entr" presetSubtype="0" fill="hold" nodeType="clickEffect">
+                                  <p:stCondLst>
+                                    <p:cond delay="0"/>
+                                  </p:stCondLst>
+                                  <p:childTnLst>
+                                    <p:set>
+                                      <p:cBhvr>
+                                        <p:cTn id="26" dur="1" fill="hold">
+                                          <p:stCondLst>
+                                            <p:cond delay="0"/>
+                                          </p:stCondLst>
+                                        </p:cTn>
+                                        <p:tgtEl>
+                                          <p:spTgt spid="3">
+                                            <p:txEl>
+                                              <p:pRg st="8" end="8"/>
+                                            </p:txEl>
+                                          </p:spTgt>
+                                        </p:tgtEl>
+                                        <p:attrNameLst>
+                                          <p:attrName>style.visibility</p:attrName>
+                                        </p:attrNameLst>
+                                      </p:cBhvr>
+                                      <p:to>
+                                        <p:strVal val="visible"/>
+                                      </p:to>
+                                    </p:set>
+                                  </p:childTnLst>
+                                </p:cTn>
+                              </p:par>
+                              <p:par>
+                                <p:cTn id="27" presetID="1" presetClass="entr" presetSubtype="0" fill="hold" nodeType="withEffect">
+                                  <p:stCondLst>
+                                    <p:cond delay="0"/>
+                                  </p:stCondLst>
+                                  <p:childTnLst>
+                                    <p:set>
+                                      <p:cBhvr>
+                                        <p:cTn id="28" dur="1" fill="hold">
+                                          <p:stCondLst>
+                                            <p:cond delay="0"/>
+                                          </p:stCondLst>
+                                        </p:cTn>
+                                        <p:tgtEl>
+                                          <p:spTgt spid="3">
+                                            <p:txEl>
+                                              <p:pRg st="9" end="9"/>
+                                            </p:txEl>
+                                          </p:spTgt>
+                                        </p:tgtEl>
+                                        <p:attrNameLst>
+                                          <p:attrName>style.visibility</p:attrName>
+                                        </p:attrNameLst>
+                                      </p:cBhvr>
+                                      <p:to>
+                                        <p:strVal val="visible"/>
+                                      </p:to>
+                                    </p:set>
+                                  </p:childTnLst>
+                                </p:cTn>
+                              </p:par>
+                            </p:childTnLst>
+                          </p:cTn>
+                        </p:par>
+                      </p:childTnLst>
+                    </p:cTn>
+                  </p:par>
+                </p:childTnLst>
+              </p:cTn>
+              <p:prevCondLst>
+                <p:cond evt="onPrev" delay="0">
+                  <p:tgtEl>
+                    <p:sldTgt/>
+                  </p:tgtEl>
+                </p:cond>
+              </p:prevCondLst>
+              <p:nextCondLst>
+                <p:cond evt="onNext" delay="0">
+                  <p:tgtEl>
+                    <p:sldTgt/>
+                  </p:tgtEl>
+                </p:cond>
+              </p:nextCondLst>
+            </p:seq>
+          </p:childTnLst>
+        </p:cTn>
+      </p:par>
+    </p:tnLst>
+  </p:timing>
+</p:sld>
+</file>
+
+<file path=ppt/slides/slide44.xml><?xml version="1.0" encoding="utf-8"?>
 <p:sld xmlns:a="http://schemas.openxmlformats.org/drawingml/2006/main" xmlns:r="http://schemas.openxmlformats.org/officeDocument/2006/relationships" xmlns:p="http://schemas.openxmlformats.org/presentationml/2006/main">
   <p:cSld>
     <p:spTree>
@@ -40685,43 +42557,35 @@
               <a:rPr lang="en-US" dirty="0">
                 <a:latin typeface="+mn-lt"/>
               </a:rPr>
-              <a:t>Dimensionality reduction is an </a:t>
+              <a:t>What are the properties good dimensionality reduction algorithms?</a:t>
+            </a:r>
+          </a:p>
+          <a:p>
+            <a:r>
+              <a:rPr lang="en-US" dirty="0">
+                <a:latin typeface="+mn-lt"/>
+              </a:rPr>
+              <a:t>Goal is to find a mapping to the lower dimensional embedding space   </a:t>
+            </a:r>
+          </a:p>
+          <a:p>
+            <a:r>
+              <a:rPr lang="en-US" dirty="0">
+                <a:latin typeface="+mn-lt"/>
+              </a:rPr>
+              <a:t>Embedding should </a:t>
             </a:r>
             <a:r>
               <a:rPr lang="en-US" b="1" dirty="0">
                 <a:latin typeface="+mn-lt"/>
               </a:rPr>
-              <a:t>embedding method</a:t>
+              <a:t>minimize error </a:t>
             </a:r>
             <a:r>
               <a:rPr lang="en-US" dirty="0">
                 <a:latin typeface="+mn-lt"/>
               </a:rPr>
-              <a:t> </a:t>
-            </a:r>
-          </a:p>
-          <a:p>
-            <a:r>
-              <a:rPr lang="en-US" dirty="0">
-                <a:latin typeface="+mn-lt"/>
-              </a:rPr>
-              <a:t>Dependency implies we can map to a lower dimensional space with low loss of information   </a:t>
-            </a:r>
-          </a:p>
-          <a:p>
-            <a:r>
-              <a:rPr lang="en-US" dirty="0">
-                <a:latin typeface="+mn-lt"/>
-              </a:rPr>
-              <a:t>Goal is to find a mapping to the lower dimensional space   </a:t>
-            </a:r>
-          </a:p>
-          <a:p>
-            <a:r>
-              <a:rPr lang="en-US" dirty="0">
-                <a:latin typeface="+mn-lt"/>
-              </a:rPr>
-              <a:t>Embedding method maps high dimensional space to low dimensional space  </a:t>
+              <a:t>with original data  </a:t>
             </a:r>
           </a:p>
           <a:p>
@@ -40730,7 +42594,21 @@
               <a:rPr lang="en-US" dirty="0">
                 <a:latin typeface="+mn-lt"/>
               </a:rPr>
-              <a:t>Embedding should minimize error with original data  </a:t>
+              <a:t>Ideally, reconstruct original data by inverse transformation  </a:t>
+            </a:r>
+          </a:p>
+          <a:p>
+            <a:r>
+              <a:rPr lang="en-US" dirty="0">
+                <a:latin typeface="+mn-lt"/>
+              </a:rPr>
+              <a:t>Embedding should </a:t>
+            </a:r>
+            <a:r>
+              <a:rPr lang="en-US" b="1" dirty="0">
+                <a:latin typeface="+mn-lt"/>
+              </a:rPr>
+              <a:t>preserve distances</a:t>
             </a:r>
           </a:p>
           <a:p>
@@ -40739,33 +42617,7 @@
               <a:rPr lang="en-US" dirty="0">
                 <a:latin typeface="+mn-lt"/>
               </a:rPr>
-              <a:t>Embedding space is easier to work with </a:t>
-            </a:r>
-          </a:p>
-          <a:p>
-            <a:r>
-              <a:rPr lang="en-US" dirty="0">
-                <a:latin typeface="+mn-lt"/>
-              </a:rPr>
-              <a:t>Types of embedding methods</a:t>
-            </a:r>
-          </a:p>
-          <a:p>
-            <a:pPr lvl="1"/>
-            <a:r>
-              <a:rPr lang="en-US" dirty="0">
-                <a:latin typeface="+mn-lt"/>
-              </a:rPr>
-              <a:t>Linear mapping</a:t>
-            </a:r>
-          </a:p>
-          <a:p>
-            <a:pPr lvl="1"/>
-            <a:r>
-              <a:rPr lang="en-US" dirty="0">
-                <a:latin typeface="+mn-lt"/>
-              </a:rPr>
-              <a:t>Nonlinear mapping</a:t>
+              <a:t>Distances or similarities should not be distorted by transformation </a:t>
             </a:r>
           </a:p>
           <a:p>
@@ -41039,117 +42891,6 @@
                       </p:childTnLst>
                     </p:cTn>
                   </p:par>
-                  <p:par>
-                    <p:cTn id="23" fill="hold">
-                      <p:stCondLst>
-                        <p:cond delay="indefinite"/>
-                      </p:stCondLst>
-                      <p:childTnLst>
-                        <p:par>
-                          <p:cTn id="24" fill="hold">
-                            <p:stCondLst>
-                              <p:cond delay="0"/>
-                            </p:stCondLst>
-                            <p:childTnLst>
-                              <p:par>
-                                <p:cTn id="25" presetID="1" presetClass="entr" presetSubtype="0" fill="hold" nodeType="clickEffect">
-                                  <p:stCondLst>
-                                    <p:cond delay="0"/>
-                                  </p:stCondLst>
-                                  <p:childTnLst>
-                                    <p:set>
-                                      <p:cBhvr>
-                                        <p:cTn id="26" dur="1" fill="hold">
-                                          <p:stCondLst>
-                                            <p:cond delay="0"/>
-                                          </p:stCondLst>
-                                        </p:cTn>
-                                        <p:tgtEl>
-                                          <p:spTgt spid="3">
-                                            <p:txEl>
-                                              <p:pRg st="6" end="6"/>
-                                            </p:txEl>
-                                          </p:spTgt>
-                                        </p:tgtEl>
-                                        <p:attrNameLst>
-                                          <p:attrName>style.visibility</p:attrName>
-                                        </p:attrNameLst>
-                                      </p:cBhvr>
-                                      <p:to>
-                                        <p:strVal val="visible"/>
-                                      </p:to>
-                                    </p:set>
-                                  </p:childTnLst>
-                                </p:cTn>
-                              </p:par>
-                              <p:par>
-                                <p:cTn id="27" presetID="1" presetClass="entr" presetSubtype="0" fill="hold" nodeType="withEffect">
-                                  <p:stCondLst>
-                                    <p:cond delay="0"/>
-                                  </p:stCondLst>
-                                  <p:childTnLst>
-                                    <p:set>
-                                      <p:cBhvr>
-                                        <p:cTn id="28" dur="1" fill="hold">
-                                          <p:stCondLst>
-                                            <p:cond delay="0"/>
-                                          </p:stCondLst>
-                                        </p:cTn>
-                                        <p:tgtEl>
-                                          <p:spTgt spid="3">
-                                            <p:txEl>
-                                              <p:pRg st="7" end="7"/>
-                                            </p:txEl>
-                                          </p:spTgt>
-                                        </p:tgtEl>
-                                        <p:attrNameLst>
-                                          <p:attrName>style.visibility</p:attrName>
-                                        </p:attrNameLst>
-                                      </p:cBhvr>
-                                      <p:to>
-                                        <p:strVal val="visible"/>
-                                      </p:to>
-                                    </p:set>
-                                  </p:childTnLst>
-                                </p:cTn>
-                              </p:par>
-                              <p:par>
-                                <p:cTn id="29" presetID="1" presetClass="entr" presetSubtype="0" fill="hold" nodeType="withEffect">
-                                  <p:stCondLst>
-                                    <p:cond delay="0"/>
-                                  </p:stCondLst>
-                                  <p:childTnLst>
-                                    <p:set>
-                                      <p:cBhvr>
-                                        <p:cTn id="30" dur="1" fill="hold">
-                                          <p:stCondLst>
-                                            <p:cond delay="0"/>
-                                          </p:stCondLst>
-                                        </p:cTn>
-                                        <p:tgtEl>
-                                          <p:spTgt spid="3">
-                                            <p:txEl>
-                                              <p:pRg st="8" end="8"/>
-                                            </p:txEl>
-                                          </p:spTgt>
-                                        </p:tgtEl>
-                                        <p:attrNameLst>
-                                          <p:attrName>style.visibility</p:attrName>
-                                        </p:attrNameLst>
-                                      </p:cBhvr>
-                                      <p:to>
-                                        <p:strVal val="visible"/>
-                                      </p:to>
-                                    </p:set>
-                                  </p:childTnLst>
-                                </p:cTn>
-                              </p:par>
-                            </p:childTnLst>
-                          </p:cTn>
-                        </p:par>
-                      </p:childTnLst>
-                    </p:cTn>
-                  </p:par>
                 </p:childTnLst>
               </p:cTn>
               <p:prevCondLst>
@@ -41221,8 +42962,8 @@
           </a:p>
         </p:txBody>
       </p:sp>
-      <mc:AlternateContent xmlns:mc="http://schemas.openxmlformats.org/markup-compatibility/2006">
-        <mc:Choice xmlns:a14="http://schemas.microsoft.com/office/drawing/2010/main" Requires="a14">
+      <mc:AlternateContent xmlns:mc="http://schemas.openxmlformats.org/markup-compatibility/2006" xmlns:a14="http://schemas.microsoft.com/office/drawing/2010/main">
+        <mc:Choice Requires="a14">
           <p:sp>
             <p:nvSpPr>
               <p:cNvPr id="3" name="Content Placeholder 2"/>
@@ -41389,7 +43130,7 @@
             </p:txBody>
           </p:sp>
         </mc:Choice>
-        <mc:Fallback>
+        <mc:Fallback xmlns="">
           <p:sp>
             <p:nvSpPr>
               <p:cNvPr id="3" name="Content Placeholder 2"/>

</xml_diff>